<commit_message>
Added diagrams to powerpoint
</commit_message>
<xml_diff>
--- a/Crimson Clubs (Design).pptx
+++ b/Crimson Clubs (Design).pptx
@@ -9,6 +9,14 @@
     <p:sldId id="257" r:id="rId3"/>
     <p:sldId id="258" r:id="rId4"/>
     <p:sldId id="259" r:id="rId5"/>
+    <p:sldId id="260" r:id="rId6"/>
+    <p:sldId id="261" r:id="rId7"/>
+    <p:sldId id="262" r:id="rId8"/>
+    <p:sldId id="263" r:id="rId9"/>
+    <p:sldId id="264" r:id="rId10"/>
+    <p:sldId id="265" r:id="rId11"/>
+    <p:sldId id="266" r:id="rId12"/>
+    <p:sldId id="268" r:id="rId13"/>
   </p:sldIdLst>
   <p:sldSz cx="12192000" cy="6858000"/>
   <p:notesSz cx="6858000" cy="9144000"/>
@@ -107,11 +115,12 @@
       </a:defRPr>
     </a:lvl9pPr>
   </p:defaultTextStyle>
+  <p:extLst>
+    <p:ext uri="{EFAFB233-063F-42B5-8137-9DF3F51BA10A}">
+      <p15:sldGuideLst xmlns:p15="http://schemas.microsoft.com/office/powerpoint/2012/main"/>
+    </p:ext>
+  </p:extLst>
 </p:presentation>
-</file>
-
-<file path=ppt/revisionInfo.xml><?xml version="1.0" encoding="utf-8"?>
-<p1510:revInfo xmlns:a="http://schemas.openxmlformats.org/drawingml/2006/main" xmlns:r="http://schemas.openxmlformats.org/officeDocument/2006/relationships" xmlns:p1510="http://schemas.microsoft.com/office/powerpoint/2015/10/main"/>
 </file>
 
 <file path=ppt/slideLayouts/slideLayout1.xml><?xml version="1.0" encoding="utf-8"?>
@@ -340,7 +349,7 @@
           <a:p>
             <a:fld id="{15AC6826-43DD-401D-86A3-B66E90F08BBC}" type="datetimeFigureOut">
               <a:rPr lang="en-US" smtClean="0"/>
-              <a:t>3/25/2018</a:t>
+              <a:t>3/26/2018</a:t>
             </a:fld>
             <a:endParaRPr lang="en-US"/>
           </a:p>
@@ -548,7 +557,7 @@
           <a:p>
             <a:fld id="{15AC6826-43DD-401D-86A3-B66E90F08BBC}" type="datetimeFigureOut">
               <a:rPr lang="en-US" smtClean="0"/>
-              <a:t>3/25/2018</a:t>
+              <a:t>3/26/2018</a:t>
             </a:fld>
             <a:endParaRPr lang="en-US"/>
           </a:p>
@@ -804,7 +813,7 @@
           <a:p>
             <a:fld id="{15AC6826-43DD-401D-86A3-B66E90F08BBC}" type="datetimeFigureOut">
               <a:rPr lang="en-US" smtClean="0"/>
-              <a:t>3/25/2018</a:t>
+              <a:t>3/26/2018</a:t>
             </a:fld>
             <a:endParaRPr lang="en-US"/>
           </a:p>
@@ -978,7 +987,7 @@
           <a:p>
             <a:fld id="{15AC6826-43DD-401D-86A3-B66E90F08BBC}" type="datetimeFigureOut">
               <a:rPr lang="en-US" smtClean="0"/>
-              <a:t>3/25/2018</a:t>
+              <a:t>3/26/2018</a:t>
             </a:fld>
             <a:endParaRPr lang="en-US"/>
           </a:p>
@@ -1321,7 +1330,7 @@
           <a:p>
             <a:fld id="{15AC6826-43DD-401D-86A3-B66E90F08BBC}" type="datetimeFigureOut">
               <a:rPr lang="en-US" smtClean="0"/>
-              <a:t>3/25/2018</a:t>
+              <a:t>3/26/2018</a:t>
             </a:fld>
             <a:endParaRPr lang="en-US"/>
           </a:p>
@@ -1596,7 +1605,7 @@
           <a:p>
             <a:fld id="{15AC6826-43DD-401D-86A3-B66E90F08BBC}" type="datetimeFigureOut">
               <a:rPr lang="en-US" smtClean="0"/>
-              <a:t>3/25/2018</a:t>
+              <a:t>3/26/2018</a:t>
             </a:fld>
             <a:endParaRPr lang="en-US"/>
           </a:p>
@@ -1975,7 +1984,7 @@
           <a:p>
             <a:fld id="{15AC6826-43DD-401D-86A3-B66E90F08BBC}" type="datetimeFigureOut">
               <a:rPr lang="en-US" smtClean="0"/>
-              <a:t>3/25/2018</a:t>
+              <a:t>3/26/2018</a:t>
             </a:fld>
             <a:endParaRPr lang="en-US"/>
           </a:p>
@@ -2093,7 +2102,7 @@
           <a:p>
             <a:fld id="{15AC6826-43DD-401D-86A3-B66E90F08BBC}" type="datetimeFigureOut">
               <a:rPr lang="en-US" smtClean="0"/>
-              <a:t>3/25/2018</a:t>
+              <a:t>3/26/2018</a:t>
             </a:fld>
             <a:endParaRPr lang="en-US"/>
           </a:p>
@@ -2264,7 +2273,7 @@
           <a:p>
             <a:fld id="{15AC6826-43DD-401D-86A3-B66E90F08BBC}" type="datetimeFigureOut">
               <a:rPr lang="en-US" smtClean="0"/>
-              <a:t>3/25/2018</a:t>
+              <a:t>3/26/2018</a:t>
             </a:fld>
             <a:endParaRPr lang="en-US"/>
           </a:p>
@@ -2618,7 +2627,7 @@
           <a:p>
             <a:fld id="{15AC6826-43DD-401D-86A3-B66E90F08BBC}" type="datetimeFigureOut">
               <a:rPr lang="en-US" smtClean="0"/>
-              <a:t>3/25/2018</a:t>
+              <a:t>3/26/2018</a:t>
             </a:fld>
             <a:endParaRPr lang="en-US"/>
           </a:p>
@@ -3000,7 +3009,7 @@
           <a:p>
             <a:fld id="{15AC6826-43DD-401D-86A3-B66E90F08BBC}" type="datetimeFigureOut">
               <a:rPr lang="en-US" smtClean="0"/>
-              <a:t>3/25/2018</a:t>
+              <a:t>3/26/2018</a:t>
             </a:fld>
             <a:endParaRPr lang="en-US"/>
           </a:p>
@@ -3287,7 +3296,7 @@
           <a:p>
             <a:fld id="{15AC6826-43DD-401D-86A3-B66E90F08BBC}" type="datetimeFigureOut">
               <a:rPr lang="en-US" smtClean="0"/>
-              <a:t>3/25/2018</a:t>
+              <a:t>3/26/2018</a:t>
             </a:fld>
             <a:endParaRPr lang="en-US"/>
           </a:p>
@@ -3888,6 +3897,285 @@
 </p:sld>
 </file>
 
+<file path=ppt/slides/slide10.xml><?xml version="1.0" encoding="utf-8"?>
+<p:sld xmlns:a="http://schemas.openxmlformats.org/drawingml/2006/main" xmlns:r="http://schemas.openxmlformats.org/officeDocument/2006/relationships" xmlns:p="http://schemas.openxmlformats.org/presentationml/2006/main">
+  <p:cSld>
+    <p:spTree>
+      <p:nvGrpSpPr>
+        <p:cNvPr id="1" name=""/>
+        <p:cNvGrpSpPr/>
+        <p:nvPr/>
+      </p:nvGrpSpPr>
+      <p:grpSpPr>
+        <a:xfrm>
+          <a:off x="0" y="0"/>
+          <a:ext cx="0" cy="0"/>
+          <a:chOff x="0" y="0"/>
+          <a:chExt cx="0" cy="0"/>
+        </a:xfrm>
+      </p:grpSpPr>
+      <p:sp>
+        <p:nvSpPr>
+          <p:cNvPr id="2" name="Title 1">
+            <a:extLst>
+              <a:ext uri="{FF2B5EF4-FFF2-40B4-BE49-F238E27FC236}">
+                <a16:creationId xmlns:a16="http://schemas.microsoft.com/office/drawing/2014/main" id="{CA7EE062-4494-45DB-BA9B-9CA2CB786E29}"/>
+              </a:ext>
+            </a:extLst>
+          </p:cNvPr>
+          <p:cNvSpPr>
+            <a:spLocks noGrp="1"/>
+          </p:cNvSpPr>
+          <p:nvPr>
+            <p:ph type="title"/>
+          </p:nvPr>
+        </p:nvSpPr>
+        <p:spPr/>
+        <p:txBody>
+          <a:bodyPr/>
+          <a:lstStyle/>
+          <a:p>
+            <a:r>
+              <a:rPr lang="en-US" dirty="0"/>
+              <a:t>Search Clubs</a:t>
+            </a:r>
+          </a:p>
+        </p:txBody>
+      </p:sp>
+      <p:pic>
+        <p:nvPicPr>
+          <p:cNvPr id="5" name="Content Placeholder 4">
+            <a:extLst>
+              <a:ext uri="{FF2B5EF4-FFF2-40B4-BE49-F238E27FC236}">
+                <a16:creationId xmlns:a16="http://schemas.microsoft.com/office/drawing/2014/main" id="{436A9987-A1DA-4158-A1D5-91580DAB95B9}"/>
+              </a:ext>
+            </a:extLst>
+          </p:cNvPr>
+          <p:cNvPicPr>
+            <a:picLocks noGrp="1" noChangeAspect="1"/>
+          </p:cNvPicPr>
+          <p:nvPr>
+            <p:ph idx="1"/>
+          </p:nvPr>
+        </p:nvPicPr>
+        <p:blipFill>
+          <a:blip r:embed="rId2">
+            <a:extLst>
+              <a:ext uri="{28A0092B-C50C-407E-A947-70E740481C1C}">
+                <a14:useLocalDpi xmlns:a14="http://schemas.microsoft.com/office/drawing/2010/main" val="0"/>
+              </a:ext>
+            </a:extLst>
+          </a:blip>
+          <a:stretch>
+            <a:fillRect/>
+          </a:stretch>
+        </p:blipFill>
+        <p:spPr>
+          <a:xfrm>
+            <a:off x="2380966" y="1846263"/>
+            <a:ext cx="7490394" cy="4022725"/>
+          </a:xfrm>
+        </p:spPr>
+      </p:pic>
+    </p:spTree>
+    <p:extLst>
+      <p:ext uri="{BB962C8B-B14F-4D97-AF65-F5344CB8AC3E}">
+        <p14:creationId xmlns:p14="http://schemas.microsoft.com/office/powerpoint/2010/main" val="1319571923"/>
+      </p:ext>
+    </p:extLst>
+  </p:cSld>
+  <p:clrMapOvr>
+    <a:masterClrMapping/>
+  </p:clrMapOvr>
+</p:sld>
+</file>
+
+<file path=ppt/slides/slide11.xml><?xml version="1.0" encoding="utf-8"?>
+<p:sld xmlns:a="http://schemas.openxmlformats.org/drawingml/2006/main" xmlns:r="http://schemas.openxmlformats.org/officeDocument/2006/relationships" xmlns:p="http://schemas.openxmlformats.org/presentationml/2006/main">
+  <p:cSld>
+    <p:spTree>
+      <p:nvGrpSpPr>
+        <p:cNvPr id="1" name=""/>
+        <p:cNvGrpSpPr/>
+        <p:nvPr/>
+      </p:nvGrpSpPr>
+      <p:grpSpPr>
+        <a:xfrm>
+          <a:off x="0" y="0"/>
+          <a:ext cx="0" cy="0"/>
+          <a:chOff x="0" y="0"/>
+          <a:chExt cx="0" cy="0"/>
+        </a:xfrm>
+      </p:grpSpPr>
+      <p:sp>
+        <p:nvSpPr>
+          <p:cNvPr id="2" name="Title 1">
+            <a:extLst>
+              <a:ext uri="{FF2B5EF4-FFF2-40B4-BE49-F238E27FC236}">
+                <a16:creationId xmlns:a16="http://schemas.microsoft.com/office/drawing/2014/main" id="{8EDCD3BF-7903-4346-8B47-791D45FC4964}"/>
+              </a:ext>
+            </a:extLst>
+          </p:cNvPr>
+          <p:cNvSpPr>
+            <a:spLocks noGrp="1"/>
+          </p:cNvSpPr>
+          <p:nvPr>
+            <p:ph type="title"/>
+          </p:nvPr>
+        </p:nvSpPr>
+        <p:spPr/>
+        <p:txBody>
+          <a:bodyPr/>
+          <a:lstStyle/>
+          <a:p>
+            <a:r>
+              <a:rPr lang="en-US" dirty="0"/>
+              <a:t>View Event Statistics</a:t>
+            </a:r>
+          </a:p>
+        </p:txBody>
+      </p:sp>
+      <p:pic>
+        <p:nvPicPr>
+          <p:cNvPr id="5" name="Content Placeholder 4">
+            <a:extLst>
+              <a:ext uri="{FF2B5EF4-FFF2-40B4-BE49-F238E27FC236}">
+                <a16:creationId xmlns:a16="http://schemas.microsoft.com/office/drawing/2014/main" id="{BC6E59BA-FA16-48B4-A3BC-3AB7DDCB0F1E}"/>
+              </a:ext>
+            </a:extLst>
+          </p:cNvPr>
+          <p:cNvPicPr>
+            <a:picLocks noGrp="1" noChangeAspect="1"/>
+          </p:cNvPicPr>
+          <p:nvPr>
+            <p:ph idx="1"/>
+          </p:nvPr>
+        </p:nvPicPr>
+        <p:blipFill>
+          <a:blip r:embed="rId2">
+            <a:extLst>
+              <a:ext uri="{28A0092B-C50C-407E-A947-70E740481C1C}">
+                <a14:useLocalDpi xmlns:a14="http://schemas.microsoft.com/office/drawing/2010/main" val="0"/>
+              </a:ext>
+            </a:extLst>
+          </a:blip>
+          <a:stretch>
+            <a:fillRect/>
+          </a:stretch>
+        </p:blipFill>
+        <p:spPr>
+          <a:xfrm>
+            <a:off x="2233394" y="1846263"/>
+            <a:ext cx="7785538" cy="4022725"/>
+          </a:xfrm>
+        </p:spPr>
+      </p:pic>
+    </p:spTree>
+    <p:extLst>
+      <p:ext uri="{BB962C8B-B14F-4D97-AF65-F5344CB8AC3E}">
+        <p14:creationId xmlns:p14="http://schemas.microsoft.com/office/powerpoint/2010/main" val="3007085863"/>
+      </p:ext>
+    </p:extLst>
+  </p:cSld>
+  <p:clrMapOvr>
+    <a:masterClrMapping/>
+  </p:clrMapOvr>
+</p:sld>
+</file>
+
+<file path=ppt/slides/slide12.xml><?xml version="1.0" encoding="utf-8"?>
+<p:sld xmlns:a="http://schemas.openxmlformats.org/drawingml/2006/main" xmlns:r="http://schemas.openxmlformats.org/officeDocument/2006/relationships" xmlns:p="http://schemas.openxmlformats.org/presentationml/2006/main">
+  <p:cSld>
+    <p:spTree>
+      <p:nvGrpSpPr>
+        <p:cNvPr id="1" name=""/>
+        <p:cNvGrpSpPr/>
+        <p:nvPr/>
+      </p:nvGrpSpPr>
+      <p:grpSpPr>
+        <a:xfrm>
+          <a:off x="0" y="0"/>
+          <a:ext cx="0" cy="0"/>
+          <a:chOff x="0" y="0"/>
+          <a:chExt cx="0" cy="0"/>
+        </a:xfrm>
+      </p:grpSpPr>
+      <p:sp>
+        <p:nvSpPr>
+          <p:cNvPr id="2" name="Title 1">
+            <a:extLst>
+              <a:ext uri="{FF2B5EF4-FFF2-40B4-BE49-F238E27FC236}">
+                <a16:creationId xmlns:a16="http://schemas.microsoft.com/office/drawing/2014/main" id="{315BC2CF-9F6F-4594-9D86-98EAFF02B8F0}"/>
+              </a:ext>
+            </a:extLst>
+          </p:cNvPr>
+          <p:cNvSpPr>
+            <a:spLocks noGrp="1"/>
+          </p:cNvSpPr>
+          <p:nvPr>
+            <p:ph type="title"/>
+          </p:nvPr>
+        </p:nvSpPr>
+        <p:spPr/>
+        <p:txBody>
+          <a:bodyPr/>
+          <a:lstStyle/>
+          <a:p>
+            <a:r>
+              <a:rPr lang="en-US" dirty="0"/>
+              <a:t>View Calendar</a:t>
+            </a:r>
+          </a:p>
+        </p:txBody>
+      </p:sp>
+      <p:pic>
+        <p:nvPicPr>
+          <p:cNvPr id="5" name="Content Placeholder 4">
+            <a:extLst>
+              <a:ext uri="{FF2B5EF4-FFF2-40B4-BE49-F238E27FC236}">
+                <a16:creationId xmlns:a16="http://schemas.microsoft.com/office/drawing/2014/main" id="{D412D30C-ABF5-4A19-B509-70AF20895314}"/>
+              </a:ext>
+            </a:extLst>
+          </p:cNvPr>
+          <p:cNvPicPr>
+            <a:picLocks noGrp="1" noChangeAspect="1"/>
+          </p:cNvPicPr>
+          <p:nvPr>
+            <p:ph idx="1"/>
+          </p:nvPr>
+        </p:nvPicPr>
+        <p:blipFill>
+          <a:blip r:embed="rId2">
+            <a:extLst>
+              <a:ext uri="{28A0092B-C50C-407E-A947-70E740481C1C}">
+                <a14:useLocalDpi xmlns:a14="http://schemas.microsoft.com/office/drawing/2010/main" val="0"/>
+              </a:ext>
+            </a:extLst>
+          </a:blip>
+          <a:stretch>
+            <a:fillRect/>
+          </a:stretch>
+        </p:blipFill>
+        <p:spPr>
+          <a:xfrm>
+            <a:off x="2642354" y="1846263"/>
+            <a:ext cx="6967618" cy="4022725"/>
+          </a:xfrm>
+        </p:spPr>
+      </p:pic>
+    </p:spTree>
+    <p:extLst>
+      <p:ext uri="{BB962C8B-B14F-4D97-AF65-F5344CB8AC3E}">
+        <p14:creationId xmlns:p14="http://schemas.microsoft.com/office/powerpoint/2010/main" val="1336687778"/>
+      </p:ext>
+    </p:extLst>
+  </p:cSld>
+  <p:clrMapOvr>
+    <a:masterClrMapping/>
+  </p:clrMapOvr>
+</p:sld>
+</file>
+
 <file path=ppt/slides/slide2.xml><?xml version="1.0" encoding="utf-8"?>
 <p:sld xmlns:a="http://schemas.openxmlformats.org/drawingml/2006/main" xmlns:r="http://schemas.openxmlformats.org/officeDocument/2006/relationships" xmlns:p="http://schemas.openxmlformats.org/presentationml/2006/main">
   <p:cSld>
@@ -4022,31 +4310,41 @@
           </a:p>
         </p:txBody>
       </p:sp>
-      <p:sp>
-        <p:nvSpPr>
-          <p:cNvPr id="3" name="Content Placeholder 2">
+      <p:pic>
+        <p:nvPicPr>
+          <p:cNvPr id="5" name="Content Placeholder 4">
             <a:extLst>
               <a:ext uri="{FF2B5EF4-FFF2-40B4-BE49-F238E27FC236}">
-                <a16:creationId xmlns:a16="http://schemas.microsoft.com/office/drawing/2014/main" id="{7F79FD8B-52C5-458A-B3ED-8D559C559FCC}"/>
+                <a16:creationId xmlns:a16="http://schemas.microsoft.com/office/drawing/2014/main" id="{4B984712-5FDF-4368-915F-5018E0784224}"/>
               </a:ext>
             </a:extLst>
           </p:cNvPr>
-          <p:cNvSpPr>
-            <a:spLocks noGrp="1"/>
-          </p:cNvSpPr>
+          <p:cNvPicPr>
+            <a:picLocks noGrp="1" noChangeAspect="1"/>
+          </p:cNvPicPr>
           <p:nvPr>
             <p:ph idx="1"/>
           </p:nvPr>
-        </p:nvSpPr>
-        <p:spPr/>
-        <p:txBody>
-          <a:bodyPr/>
-          <a:lstStyle/>
-          <a:p>
-            <a:endParaRPr lang="en-US"/>
-          </a:p>
-        </p:txBody>
-      </p:sp>
+        </p:nvPicPr>
+        <p:blipFill>
+          <a:blip r:embed="rId2">
+            <a:extLst>
+              <a:ext uri="{28A0092B-C50C-407E-A947-70E740481C1C}">
+                <a14:useLocalDpi xmlns:a14="http://schemas.microsoft.com/office/drawing/2010/main" val="0"/>
+              </a:ext>
+            </a:extLst>
+          </a:blip>
+          <a:stretch>
+            <a:fillRect/>
+          </a:stretch>
+        </p:blipFill>
+        <p:spPr>
+          <a:xfrm>
+            <a:off x="2968847" y="1846263"/>
+            <a:ext cx="6314631" cy="4022725"/>
+          </a:xfrm>
+        </p:spPr>
+      </p:pic>
     </p:spTree>
     <p:extLst>
       <p:ext uri="{BB962C8B-B14F-4D97-AF65-F5344CB8AC3E}">
@@ -4099,41 +4397,516 @@
           <a:lstStyle/>
           <a:p>
             <a:r>
-              <a:rPr lang="en-US"/>
-              <a:t>Sequence Diagrams</a:t>
-            </a:r>
-          </a:p>
-        </p:txBody>
-      </p:sp>
-      <p:sp>
-        <p:nvSpPr>
-          <p:cNvPr id="3" name="Content Placeholder 2">
+              <a:rPr lang="en-US" dirty="0"/>
+              <a:t>Create Profile</a:t>
+            </a:r>
+          </a:p>
+        </p:txBody>
+      </p:sp>
+      <p:pic>
+        <p:nvPicPr>
+          <p:cNvPr id="5" name="Content Placeholder 4">
             <a:extLst>
               <a:ext uri="{FF2B5EF4-FFF2-40B4-BE49-F238E27FC236}">
-                <a16:creationId xmlns:a16="http://schemas.microsoft.com/office/drawing/2014/main" id="{6BB53810-232D-44DA-8C0B-224FAD1AE31E}"/>
+                <a16:creationId xmlns:a16="http://schemas.microsoft.com/office/drawing/2014/main" id="{C348EC45-D08E-4A90-A2F1-B5B435F6178E}"/>
               </a:ext>
             </a:extLst>
           </p:cNvPr>
-          <p:cNvSpPr>
-            <a:spLocks noGrp="1"/>
-          </p:cNvSpPr>
+          <p:cNvPicPr>
+            <a:picLocks noGrp="1" noChangeAspect="1"/>
+          </p:cNvPicPr>
           <p:nvPr>
             <p:ph idx="1"/>
           </p:nvPr>
-        </p:nvSpPr>
-        <p:spPr/>
-        <p:txBody>
-          <a:bodyPr/>
-          <a:lstStyle/>
-          <a:p>
-            <a:endParaRPr lang="en-US"/>
-          </a:p>
-        </p:txBody>
-      </p:sp>
+        </p:nvPicPr>
+        <p:blipFill>
+          <a:blip r:embed="rId2">
+            <a:extLst>
+              <a:ext uri="{28A0092B-C50C-407E-A947-70E740481C1C}">
+                <a14:useLocalDpi xmlns:a14="http://schemas.microsoft.com/office/drawing/2010/main" val="0"/>
+              </a:ext>
+            </a:extLst>
+          </a:blip>
+          <a:stretch>
+            <a:fillRect/>
+          </a:stretch>
+        </p:blipFill>
+        <p:spPr>
+          <a:xfrm>
+            <a:off x="2098124" y="1846263"/>
+            <a:ext cx="8056078" cy="4022725"/>
+          </a:xfrm>
+        </p:spPr>
+      </p:pic>
     </p:spTree>
     <p:extLst>
       <p:ext uri="{BB962C8B-B14F-4D97-AF65-F5344CB8AC3E}">
         <p14:creationId xmlns:p14="http://schemas.microsoft.com/office/powerpoint/2010/main" val="1496137810"/>
+      </p:ext>
+    </p:extLst>
+  </p:cSld>
+  <p:clrMapOvr>
+    <a:masterClrMapping/>
+  </p:clrMapOvr>
+</p:sld>
+</file>
+
+<file path=ppt/slides/slide5.xml><?xml version="1.0" encoding="utf-8"?>
+<p:sld xmlns:a="http://schemas.openxmlformats.org/drawingml/2006/main" xmlns:r="http://schemas.openxmlformats.org/officeDocument/2006/relationships" xmlns:p="http://schemas.openxmlformats.org/presentationml/2006/main">
+  <p:cSld>
+    <p:spTree>
+      <p:nvGrpSpPr>
+        <p:cNvPr id="1" name=""/>
+        <p:cNvGrpSpPr/>
+        <p:nvPr/>
+      </p:nvGrpSpPr>
+      <p:grpSpPr>
+        <a:xfrm>
+          <a:off x="0" y="0"/>
+          <a:ext cx="0" cy="0"/>
+          <a:chOff x="0" y="0"/>
+          <a:chExt cx="0" cy="0"/>
+        </a:xfrm>
+      </p:grpSpPr>
+      <p:sp>
+        <p:nvSpPr>
+          <p:cNvPr id="2" name="Title 1">
+            <a:extLst>
+              <a:ext uri="{FF2B5EF4-FFF2-40B4-BE49-F238E27FC236}">
+                <a16:creationId xmlns:a16="http://schemas.microsoft.com/office/drawing/2014/main" id="{A840D691-F4D5-42C8-85F4-FE4FBB395304}"/>
+              </a:ext>
+            </a:extLst>
+          </p:cNvPr>
+          <p:cNvSpPr>
+            <a:spLocks noGrp="1"/>
+          </p:cNvSpPr>
+          <p:nvPr>
+            <p:ph type="title"/>
+          </p:nvPr>
+        </p:nvSpPr>
+        <p:spPr/>
+        <p:txBody>
+          <a:bodyPr/>
+          <a:lstStyle/>
+          <a:p>
+            <a:r>
+              <a:rPr lang="en-US" dirty="0"/>
+              <a:t>Create Club</a:t>
+            </a:r>
+          </a:p>
+        </p:txBody>
+      </p:sp>
+      <p:pic>
+        <p:nvPicPr>
+          <p:cNvPr id="5" name="Content Placeholder 4">
+            <a:extLst>
+              <a:ext uri="{FF2B5EF4-FFF2-40B4-BE49-F238E27FC236}">
+                <a16:creationId xmlns:a16="http://schemas.microsoft.com/office/drawing/2014/main" id="{5463F9B5-F910-4CF6-89FC-140FF0C5ECBA}"/>
+              </a:ext>
+            </a:extLst>
+          </p:cNvPr>
+          <p:cNvPicPr>
+            <a:picLocks noGrp="1" noChangeAspect="1"/>
+          </p:cNvPicPr>
+          <p:nvPr>
+            <p:ph idx="1"/>
+          </p:nvPr>
+        </p:nvPicPr>
+        <p:blipFill>
+          <a:blip r:embed="rId2">
+            <a:extLst>
+              <a:ext uri="{28A0092B-C50C-407E-A947-70E740481C1C}">
+                <a14:useLocalDpi xmlns:a14="http://schemas.microsoft.com/office/drawing/2010/main" val="0"/>
+              </a:ext>
+            </a:extLst>
+          </a:blip>
+          <a:stretch>
+            <a:fillRect/>
+          </a:stretch>
+        </p:blipFill>
+        <p:spPr>
+          <a:xfrm>
+            <a:off x="2782421" y="2614439"/>
+            <a:ext cx="6687483" cy="2486372"/>
+          </a:xfrm>
+        </p:spPr>
+      </p:pic>
+    </p:spTree>
+    <p:extLst>
+      <p:ext uri="{BB962C8B-B14F-4D97-AF65-F5344CB8AC3E}">
+        <p14:creationId xmlns:p14="http://schemas.microsoft.com/office/powerpoint/2010/main" val="798308918"/>
+      </p:ext>
+    </p:extLst>
+  </p:cSld>
+  <p:clrMapOvr>
+    <a:masterClrMapping/>
+  </p:clrMapOvr>
+</p:sld>
+</file>
+
+<file path=ppt/slides/slide6.xml><?xml version="1.0" encoding="utf-8"?>
+<p:sld xmlns:a="http://schemas.openxmlformats.org/drawingml/2006/main" xmlns:r="http://schemas.openxmlformats.org/officeDocument/2006/relationships" xmlns:p="http://schemas.openxmlformats.org/presentationml/2006/main">
+  <p:cSld>
+    <p:spTree>
+      <p:nvGrpSpPr>
+        <p:cNvPr id="1" name=""/>
+        <p:cNvGrpSpPr/>
+        <p:nvPr/>
+      </p:nvGrpSpPr>
+      <p:grpSpPr>
+        <a:xfrm>
+          <a:off x="0" y="0"/>
+          <a:ext cx="0" cy="0"/>
+          <a:chOff x="0" y="0"/>
+          <a:chExt cx="0" cy="0"/>
+        </a:xfrm>
+      </p:grpSpPr>
+      <p:sp>
+        <p:nvSpPr>
+          <p:cNvPr id="2" name="Title 1">
+            <a:extLst>
+              <a:ext uri="{FF2B5EF4-FFF2-40B4-BE49-F238E27FC236}">
+                <a16:creationId xmlns:a16="http://schemas.microsoft.com/office/drawing/2014/main" id="{1A5B2C31-61B9-43D3-8F41-50314B6A39D6}"/>
+              </a:ext>
+            </a:extLst>
+          </p:cNvPr>
+          <p:cNvSpPr>
+            <a:spLocks noGrp="1"/>
+          </p:cNvSpPr>
+          <p:nvPr>
+            <p:ph type="title"/>
+          </p:nvPr>
+        </p:nvSpPr>
+        <p:spPr/>
+        <p:txBody>
+          <a:bodyPr/>
+          <a:lstStyle/>
+          <a:p>
+            <a:r>
+              <a:rPr lang="en-US" dirty="0"/>
+              <a:t>Create Event</a:t>
+            </a:r>
+          </a:p>
+        </p:txBody>
+      </p:sp>
+      <p:pic>
+        <p:nvPicPr>
+          <p:cNvPr id="5" name="Content Placeholder 4">
+            <a:extLst>
+              <a:ext uri="{FF2B5EF4-FFF2-40B4-BE49-F238E27FC236}">
+                <a16:creationId xmlns:a16="http://schemas.microsoft.com/office/drawing/2014/main" id="{96DE7A9B-F1C2-409A-A4F8-17D72E82B42D}"/>
+              </a:ext>
+            </a:extLst>
+          </p:cNvPr>
+          <p:cNvPicPr>
+            <a:picLocks noGrp="1" noChangeAspect="1"/>
+          </p:cNvPicPr>
+          <p:nvPr>
+            <p:ph idx="1"/>
+          </p:nvPr>
+        </p:nvPicPr>
+        <p:blipFill>
+          <a:blip r:embed="rId2">
+            <a:extLst>
+              <a:ext uri="{28A0092B-C50C-407E-A947-70E740481C1C}">
+                <a14:useLocalDpi xmlns:a14="http://schemas.microsoft.com/office/drawing/2010/main" val="0"/>
+              </a:ext>
+            </a:extLst>
+          </a:blip>
+          <a:stretch>
+            <a:fillRect/>
+          </a:stretch>
+        </p:blipFill>
+        <p:spPr>
+          <a:xfrm>
+            <a:off x="1491603" y="2261965"/>
+            <a:ext cx="9269119" cy="3191320"/>
+          </a:xfrm>
+        </p:spPr>
+      </p:pic>
+    </p:spTree>
+    <p:extLst>
+      <p:ext uri="{BB962C8B-B14F-4D97-AF65-F5344CB8AC3E}">
+        <p14:creationId xmlns:p14="http://schemas.microsoft.com/office/powerpoint/2010/main" val="963349387"/>
+      </p:ext>
+    </p:extLst>
+  </p:cSld>
+  <p:clrMapOvr>
+    <a:masterClrMapping/>
+  </p:clrMapOvr>
+</p:sld>
+</file>
+
+<file path=ppt/slides/slide7.xml><?xml version="1.0" encoding="utf-8"?>
+<p:sld xmlns:a="http://schemas.openxmlformats.org/drawingml/2006/main" xmlns:r="http://schemas.openxmlformats.org/officeDocument/2006/relationships" xmlns:p="http://schemas.openxmlformats.org/presentationml/2006/main">
+  <p:cSld>
+    <p:spTree>
+      <p:nvGrpSpPr>
+        <p:cNvPr id="1" name=""/>
+        <p:cNvGrpSpPr/>
+        <p:nvPr/>
+      </p:nvGrpSpPr>
+      <p:grpSpPr>
+        <a:xfrm>
+          <a:off x="0" y="0"/>
+          <a:ext cx="0" cy="0"/>
+          <a:chOff x="0" y="0"/>
+          <a:chExt cx="0" cy="0"/>
+        </a:xfrm>
+      </p:grpSpPr>
+      <p:sp>
+        <p:nvSpPr>
+          <p:cNvPr id="2" name="Title 1">
+            <a:extLst>
+              <a:ext uri="{FF2B5EF4-FFF2-40B4-BE49-F238E27FC236}">
+                <a16:creationId xmlns:a16="http://schemas.microsoft.com/office/drawing/2014/main" id="{511E7CCA-A5FD-40A0-B51C-117B3F9B28F8}"/>
+              </a:ext>
+            </a:extLst>
+          </p:cNvPr>
+          <p:cNvSpPr>
+            <a:spLocks noGrp="1"/>
+          </p:cNvSpPr>
+          <p:nvPr>
+            <p:ph type="title"/>
+          </p:nvPr>
+        </p:nvSpPr>
+        <p:spPr/>
+        <p:txBody>
+          <a:bodyPr/>
+          <a:lstStyle/>
+          <a:p>
+            <a:r>
+              <a:rPr lang="en-US" dirty="0"/>
+              <a:t>Join Club</a:t>
+            </a:r>
+          </a:p>
+        </p:txBody>
+      </p:sp>
+      <p:pic>
+        <p:nvPicPr>
+          <p:cNvPr id="5" name="Content Placeholder 4">
+            <a:extLst>
+              <a:ext uri="{FF2B5EF4-FFF2-40B4-BE49-F238E27FC236}">
+                <a16:creationId xmlns:a16="http://schemas.microsoft.com/office/drawing/2014/main" id="{F3E17A34-B346-4CE0-B0C5-991228262EDB}"/>
+              </a:ext>
+            </a:extLst>
+          </p:cNvPr>
+          <p:cNvPicPr>
+            <a:picLocks noGrp="1" noChangeAspect="1"/>
+          </p:cNvPicPr>
+          <p:nvPr>
+            <p:ph idx="1"/>
+          </p:nvPr>
+        </p:nvPicPr>
+        <p:blipFill>
+          <a:blip r:embed="rId2">
+            <a:extLst>
+              <a:ext uri="{28A0092B-C50C-407E-A947-70E740481C1C}">
+                <a14:useLocalDpi xmlns:a14="http://schemas.microsoft.com/office/drawing/2010/main" val="0"/>
+              </a:ext>
+            </a:extLst>
+          </a:blip>
+          <a:stretch>
+            <a:fillRect/>
+          </a:stretch>
+        </p:blipFill>
+        <p:spPr>
+          <a:xfrm>
+            <a:off x="1811146" y="1846263"/>
+            <a:ext cx="8630033" cy="4022725"/>
+          </a:xfrm>
+        </p:spPr>
+      </p:pic>
+    </p:spTree>
+    <p:extLst>
+      <p:ext uri="{BB962C8B-B14F-4D97-AF65-F5344CB8AC3E}">
+        <p14:creationId xmlns:p14="http://schemas.microsoft.com/office/powerpoint/2010/main" val="3180704940"/>
+      </p:ext>
+    </p:extLst>
+  </p:cSld>
+  <p:clrMapOvr>
+    <a:masterClrMapping/>
+  </p:clrMapOvr>
+</p:sld>
+</file>
+
+<file path=ppt/slides/slide8.xml><?xml version="1.0" encoding="utf-8"?>
+<p:sld xmlns:a="http://schemas.openxmlformats.org/drawingml/2006/main" xmlns:r="http://schemas.openxmlformats.org/officeDocument/2006/relationships" xmlns:p="http://schemas.openxmlformats.org/presentationml/2006/main">
+  <p:cSld>
+    <p:spTree>
+      <p:nvGrpSpPr>
+        <p:cNvPr id="1" name=""/>
+        <p:cNvGrpSpPr/>
+        <p:nvPr/>
+      </p:nvGrpSpPr>
+      <p:grpSpPr>
+        <a:xfrm>
+          <a:off x="0" y="0"/>
+          <a:ext cx="0" cy="0"/>
+          <a:chOff x="0" y="0"/>
+          <a:chExt cx="0" cy="0"/>
+        </a:xfrm>
+      </p:grpSpPr>
+      <p:sp>
+        <p:nvSpPr>
+          <p:cNvPr id="2" name="Title 1">
+            <a:extLst>
+              <a:ext uri="{FF2B5EF4-FFF2-40B4-BE49-F238E27FC236}">
+                <a16:creationId xmlns:a16="http://schemas.microsoft.com/office/drawing/2014/main" id="{02540FA4-77CF-4A56-9097-B9FE2C134D13}"/>
+              </a:ext>
+            </a:extLst>
+          </p:cNvPr>
+          <p:cNvSpPr>
+            <a:spLocks noGrp="1"/>
+          </p:cNvSpPr>
+          <p:nvPr>
+            <p:ph type="title"/>
+          </p:nvPr>
+        </p:nvSpPr>
+        <p:spPr/>
+        <p:txBody>
+          <a:bodyPr/>
+          <a:lstStyle/>
+          <a:p>
+            <a:r>
+              <a:rPr lang="en-US" dirty="0"/>
+              <a:t>Leave Club</a:t>
+            </a:r>
+          </a:p>
+        </p:txBody>
+      </p:sp>
+      <p:pic>
+        <p:nvPicPr>
+          <p:cNvPr id="5" name="Content Placeholder 4">
+            <a:extLst>
+              <a:ext uri="{FF2B5EF4-FFF2-40B4-BE49-F238E27FC236}">
+                <a16:creationId xmlns:a16="http://schemas.microsoft.com/office/drawing/2014/main" id="{8808A8B9-9E47-4B82-9910-BA770C88A9B6}"/>
+              </a:ext>
+            </a:extLst>
+          </p:cNvPr>
+          <p:cNvPicPr>
+            <a:picLocks noGrp="1" noChangeAspect="1"/>
+          </p:cNvPicPr>
+          <p:nvPr>
+            <p:ph idx="1"/>
+          </p:nvPr>
+        </p:nvPicPr>
+        <p:blipFill>
+          <a:blip r:embed="rId2">
+            <a:extLst>
+              <a:ext uri="{28A0092B-C50C-407E-A947-70E740481C1C}">
+                <a14:useLocalDpi xmlns:a14="http://schemas.microsoft.com/office/drawing/2010/main" val="0"/>
+              </a:ext>
+            </a:extLst>
+          </a:blip>
+          <a:stretch>
+            <a:fillRect/>
+          </a:stretch>
+        </p:blipFill>
+        <p:spPr>
+          <a:xfrm>
+            <a:off x="2443509" y="1846263"/>
+            <a:ext cx="7365307" cy="4022725"/>
+          </a:xfrm>
+        </p:spPr>
+      </p:pic>
+    </p:spTree>
+    <p:extLst>
+      <p:ext uri="{BB962C8B-B14F-4D97-AF65-F5344CB8AC3E}">
+        <p14:creationId xmlns:p14="http://schemas.microsoft.com/office/powerpoint/2010/main" val="835220665"/>
+      </p:ext>
+    </p:extLst>
+  </p:cSld>
+  <p:clrMapOvr>
+    <a:masterClrMapping/>
+  </p:clrMapOvr>
+</p:sld>
+</file>
+
+<file path=ppt/slides/slide9.xml><?xml version="1.0" encoding="utf-8"?>
+<p:sld xmlns:a="http://schemas.openxmlformats.org/drawingml/2006/main" xmlns:r="http://schemas.openxmlformats.org/officeDocument/2006/relationships" xmlns:p="http://schemas.openxmlformats.org/presentationml/2006/main">
+  <p:cSld>
+    <p:spTree>
+      <p:nvGrpSpPr>
+        <p:cNvPr id="1" name=""/>
+        <p:cNvGrpSpPr/>
+        <p:nvPr/>
+      </p:nvGrpSpPr>
+      <p:grpSpPr>
+        <a:xfrm>
+          <a:off x="0" y="0"/>
+          <a:ext cx="0" cy="0"/>
+          <a:chOff x="0" y="0"/>
+          <a:chExt cx="0" cy="0"/>
+        </a:xfrm>
+      </p:grpSpPr>
+      <p:sp>
+        <p:nvSpPr>
+          <p:cNvPr id="2" name="Title 1">
+            <a:extLst>
+              <a:ext uri="{FF2B5EF4-FFF2-40B4-BE49-F238E27FC236}">
+                <a16:creationId xmlns:a16="http://schemas.microsoft.com/office/drawing/2014/main" id="{9AA0BEBA-FC1B-4446-8ED7-F17F34A4859A}"/>
+              </a:ext>
+            </a:extLst>
+          </p:cNvPr>
+          <p:cNvSpPr>
+            <a:spLocks noGrp="1"/>
+          </p:cNvSpPr>
+          <p:nvPr>
+            <p:ph type="title"/>
+          </p:nvPr>
+        </p:nvSpPr>
+        <p:spPr/>
+        <p:txBody>
+          <a:bodyPr/>
+          <a:lstStyle/>
+          <a:p>
+            <a:r>
+              <a:rPr lang="en-US" dirty="0"/>
+              <a:t>Login Activity</a:t>
+            </a:r>
+          </a:p>
+        </p:txBody>
+      </p:sp>
+      <p:pic>
+        <p:nvPicPr>
+          <p:cNvPr id="5" name="Content Placeholder 4">
+            <a:extLst>
+              <a:ext uri="{FF2B5EF4-FFF2-40B4-BE49-F238E27FC236}">
+                <a16:creationId xmlns:a16="http://schemas.microsoft.com/office/drawing/2014/main" id="{D58929C8-5807-4349-813D-ADEBF8AD357C}"/>
+              </a:ext>
+            </a:extLst>
+          </p:cNvPr>
+          <p:cNvPicPr>
+            <a:picLocks noGrp="1" noChangeAspect="1"/>
+          </p:cNvPicPr>
+          <p:nvPr>
+            <p:ph idx="1"/>
+          </p:nvPr>
+        </p:nvPicPr>
+        <p:blipFill>
+          <a:blip r:embed="rId2">
+            <a:extLst>
+              <a:ext uri="{28A0092B-C50C-407E-A947-70E740481C1C}">
+                <a14:useLocalDpi xmlns:a14="http://schemas.microsoft.com/office/drawing/2010/main" val="0"/>
+              </a:ext>
+            </a:extLst>
+          </a:blip>
+          <a:stretch>
+            <a:fillRect/>
+          </a:stretch>
+        </p:blipFill>
+        <p:spPr>
+          <a:xfrm>
+            <a:off x="2553789" y="2833545"/>
+            <a:ext cx="7144747" cy="2048161"/>
+          </a:xfrm>
+        </p:spPr>
+      </p:pic>
+    </p:spTree>
+    <p:extLst>
+      <p:ext uri="{BB962C8B-B14F-4D97-AF65-F5344CB8AC3E}">
+        <p14:creationId xmlns:p14="http://schemas.microsoft.com/office/powerpoint/2010/main" val="117432679"/>
       </p:ext>
     </p:extLst>
   </p:cSld>

</xml_diff>

<commit_message>
Added project changes and summary
</commit_message>
<xml_diff>
--- a/Crimson Clubs (Design).pptx
+++ b/Crimson Clubs (Design).pptx
@@ -17,6 +17,8 @@
     <p:sldId id="265" r:id="rId11"/>
     <p:sldId id="266" r:id="rId12"/>
     <p:sldId id="268" r:id="rId13"/>
+    <p:sldId id="269" r:id="rId14"/>
+    <p:sldId id="270" r:id="rId15"/>
   </p:sldIdLst>
   <p:sldSz cx="12192000" cy="6858000"/>
   <p:notesSz cx="6858000" cy="9144000"/>
@@ -353,7 +355,7 @@
           <a:p>
             <a:fld id="{15AC6826-43DD-401D-86A3-B66E90F08BBC}" type="datetimeFigureOut">
               <a:rPr lang="en-US" smtClean="0"/>
-              <a:t>3/26/2018</a:t>
+              <a:t>3/27/2018</a:t>
             </a:fld>
             <a:endParaRPr lang="en-US"/>
           </a:p>
@@ -561,7 +563,7 @@
           <a:p>
             <a:fld id="{15AC6826-43DD-401D-86A3-B66E90F08BBC}" type="datetimeFigureOut">
               <a:rPr lang="en-US" smtClean="0"/>
-              <a:t>3/26/2018</a:t>
+              <a:t>3/27/2018</a:t>
             </a:fld>
             <a:endParaRPr lang="en-US"/>
           </a:p>
@@ -817,7 +819,7 @@
           <a:p>
             <a:fld id="{15AC6826-43DD-401D-86A3-B66E90F08BBC}" type="datetimeFigureOut">
               <a:rPr lang="en-US" smtClean="0"/>
-              <a:t>3/26/2018</a:t>
+              <a:t>3/27/2018</a:t>
             </a:fld>
             <a:endParaRPr lang="en-US"/>
           </a:p>
@@ -987,7 +989,7 @@
           <a:p>
             <a:fld id="{15AC6826-43DD-401D-86A3-B66E90F08BBC}" type="datetimeFigureOut">
               <a:rPr lang="en-US" smtClean="0"/>
-              <a:t>3/26/2018</a:t>
+              <a:t>3/27/2018</a:t>
             </a:fld>
             <a:endParaRPr lang="en-US"/>
           </a:p>
@@ -1330,7 +1332,7 @@
           <a:p>
             <a:fld id="{15AC6826-43DD-401D-86A3-B66E90F08BBC}" type="datetimeFigureOut">
               <a:rPr lang="en-US" smtClean="0"/>
-              <a:t>3/26/2018</a:t>
+              <a:t>3/27/2018</a:t>
             </a:fld>
             <a:endParaRPr lang="en-US"/>
           </a:p>
@@ -1605,7 +1607,7 @@
           <a:p>
             <a:fld id="{15AC6826-43DD-401D-86A3-B66E90F08BBC}" type="datetimeFigureOut">
               <a:rPr lang="en-US" smtClean="0"/>
-              <a:t>3/26/2018</a:t>
+              <a:t>3/27/2018</a:t>
             </a:fld>
             <a:endParaRPr lang="en-US"/>
           </a:p>
@@ -1984,7 +1986,7 @@
           <a:p>
             <a:fld id="{15AC6826-43DD-401D-86A3-B66E90F08BBC}" type="datetimeFigureOut">
               <a:rPr lang="en-US" smtClean="0"/>
-              <a:t>3/26/2018</a:t>
+              <a:t>3/27/2018</a:t>
             </a:fld>
             <a:endParaRPr lang="en-US"/>
           </a:p>
@@ -2102,7 +2104,7 @@
           <a:p>
             <a:fld id="{15AC6826-43DD-401D-86A3-B66E90F08BBC}" type="datetimeFigureOut">
               <a:rPr lang="en-US" smtClean="0"/>
-              <a:t>3/26/2018</a:t>
+              <a:t>3/27/2018</a:t>
             </a:fld>
             <a:endParaRPr lang="en-US"/>
           </a:p>
@@ -2273,7 +2275,7 @@
           <a:p>
             <a:fld id="{15AC6826-43DD-401D-86A3-B66E90F08BBC}" type="datetimeFigureOut">
               <a:rPr lang="en-US" smtClean="0"/>
-              <a:t>3/26/2018</a:t>
+              <a:t>3/27/2018</a:t>
             </a:fld>
             <a:endParaRPr lang="en-US"/>
           </a:p>
@@ -2627,7 +2629,7 @@
           <a:p>
             <a:fld id="{15AC6826-43DD-401D-86A3-B66E90F08BBC}" type="datetimeFigureOut">
               <a:rPr lang="en-US" smtClean="0"/>
-              <a:t>3/26/2018</a:t>
+              <a:t>3/27/2018</a:t>
             </a:fld>
             <a:endParaRPr lang="en-US"/>
           </a:p>
@@ -3004,7 +3006,7 @@
           <a:p>
             <a:fld id="{15AC6826-43DD-401D-86A3-B66E90F08BBC}" type="datetimeFigureOut">
               <a:rPr lang="en-US" smtClean="0"/>
-              <a:t>3/26/2018</a:t>
+              <a:t>3/27/2018</a:t>
             </a:fld>
             <a:endParaRPr lang="en-US"/>
           </a:p>
@@ -3291,7 +3293,7 @@
           <a:p>
             <a:fld id="{15AC6826-43DD-401D-86A3-B66E90F08BBC}" type="datetimeFigureOut">
               <a:rPr lang="en-US" smtClean="0"/>
-              <a:t>3/26/2018</a:t>
+              <a:t>3/27/2018</a:t>
             </a:fld>
             <a:endParaRPr lang="en-US"/>
           </a:p>
@@ -4204,6 +4206,234 @@
 </p:sld>
 </file>
 
+<file path=ppt/slides/slide13.xml><?xml version="1.0" encoding="utf-8"?>
+<p:sld xmlns:a="http://schemas.openxmlformats.org/drawingml/2006/main" xmlns:r="http://schemas.openxmlformats.org/officeDocument/2006/relationships" xmlns:p="http://schemas.openxmlformats.org/presentationml/2006/main">
+  <p:cSld>
+    <p:spTree>
+      <p:nvGrpSpPr>
+        <p:cNvPr id="1" name=""/>
+        <p:cNvGrpSpPr/>
+        <p:nvPr/>
+      </p:nvGrpSpPr>
+      <p:grpSpPr>
+        <a:xfrm>
+          <a:off x="0" y="0"/>
+          <a:ext cx="0" cy="0"/>
+          <a:chOff x="0" y="0"/>
+          <a:chExt cx="0" cy="0"/>
+        </a:xfrm>
+      </p:grpSpPr>
+      <p:sp>
+        <p:nvSpPr>
+          <p:cNvPr id="2" name="Title 1"/>
+          <p:cNvSpPr>
+            <a:spLocks noGrp="1"/>
+          </p:cNvSpPr>
+          <p:nvPr>
+            <p:ph type="title"/>
+          </p:nvPr>
+        </p:nvSpPr>
+        <p:spPr/>
+        <p:txBody>
+          <a:bodyPr/>
+          <a:lstStyle/>
+          <a:p>
+            <a:r>
+              <a:rPr lang="en-US" dirty="0" smtClean="0"/>
+              <a:t>Project Changes</a:t>
+            </a:r>
+            <a:endParaRPr lang="en-US" dirty="0"/>
+          </a:p>
+        </p:txBody>
+      </p:sp>
+      <p:sp>
+        <p:nvSpPr>
+          <p:cNvPr id="3" name="Content Placeholder 2"/>
+          <p:cNvSpPr>
+            <a:spLocks noGrp="1"/>
+          </p:cNvSpPr>
+          <p:nvPr>
+            <p:ph idx="1"/>
+          </p:nvPr>
+        </p:nvSpPr>
+        <p:spPr/>
+        <p:txBody>
+          <a:bodyPr/>
+          <a:lstStyle/>
+          <a:p>
+            <a:pPr lvl="1">
+              <a:buFont typeface="Wingdings" panose="05000000000000000000" pitchFamily="2" charset="2"/>
+              <a:buChar char="§"/>
+            </a:pPr>
+            <a:r>
+              <a:rPr lang="en-US" dirty="0" smtClean="0"/>
+              <a:t>No major project changes</a:t>
+            </a:r>
+          </a:p>
+          <a:p>
+            <a:pPr lvl="1">
+              <a:buFont typeface="Wingdings" panose="05000000000000000000" pitchFamily="2" charset="2"/>
+              <a:buChar char="§"/>
+            </a:pPr>
+            <a:r>
+              <a:rPr lang="en-US" dirty="0" smtClean="0"/>
+              <a:t>Shifting focus</a:t>
+            </a:r>
+          </a:p>
+          <a:p>
+            <a:pPr lvl="2">
+              <a:buFont typeface="Wingdings" panose="05000000000000000000" pitchFamily="2" charset="2"/>
+              <a:buChar char="§"/>
+            </a:pPr>
+            <a:r>
+              <a:rPr lang="en-US" dirty="0" smtClean="0"/>
+              <a:t>Database</a:t>
+            </a:r>
+          </a:p>
+          <a:p>
+            <a:pPr lvl="2">
+              <a:buFont typeface="Wingdings" panose="05000000000000000000" pitchFamily="2" charset="2"/>
+              <a:buChar char="§"/>
+            </a:pPr>
+            <a:r>
+              <a:rPr lang="en-US" dirty="0" smtClean="0"/>
+              <a:t>Stored procedures</a:t>
+            </a:r>
+          </a:p>
+          <a:p>
+            <a:pPr lvl="2">
+              <a:buFont typeface="Wingdings" panose="05000000000000000000" pitchFamily="2" charset="2"/>
+              <a:buChar char="§"/>
+            </a:pPr>
+            <a:r>
+              <a:rPr lang="en-US" dirty="0" smtClean="0"/>
+              <a:t>Web calls</a:t>
+            </a:r>
+          </a:p>
+          <a:p>
+            <a:pPr lvl="2">
+              <a:buFont typeface="Wingdings" panose="05000000000000000000" pitchFamily="2" charset="2"/>
+              <a:buChar char="§"/>
+            </a:pPr>
+            <a:r>
+              <a:rPr lang="en-US" dirty="0" smtClean="0"/>
+              <a:t>Front end</a:t>
+            </a:r>
+          </a:p>
+        </p:txBody>
+      </p:sp>
+    </p:spTree>
+    <p:extLst>
+      <p:ext uri="{BB962C8B-B14F-4D97-AF65-F5344CB8AC3E}">
+        <p14:creationId xmlns:p14="http://schemas.microsoft.com/office/powerpoint/2010/main" val="1268471189"/>
+      </p:ext>
+    </p:extLst>
+  </p:cSld>
+  <p:clrMapOvr>
+    <a:masterClrMapping/>
+  </p:clrMapOvr>
+</p:sld>
+</file>
+
+<file path=ppt/slides/slide14.xml><?xml version="1.0" encoding="utf-8"?>
+<p:sld xmlns:a="http://schemas.openxmlformats.org/drawingml/2006/main" xmlns:r="http://schemas.openxmlformats.org/officeDocument/2006/relationships" xmlns:p="http://schemas.openxmlformats.org/presentationml/2006/main">
+  <p:cSld>
+    <p:spTree>
+      <p:nvGrpSpPr>
+        <p:cNvPr id="1" name=""/>
+        <p:cNvGrpSpPr/>
+        <p:nvPr/>
+      </p:nvGrpSpPr>
+      <p:grpSpPr>
+        <a:xfrm>
+          <a:off x="0" y="0"/>
+          <a:ext cx="0" cy="0"/>
+          <a:chOff x="0" y="0"/>
+          <a:chExt cx="0" cy="0"/>
+        </a:xfrm>
+      </p:grpSpPr>
+      <p:sp>
+        <p:nvSpPr>
+          <p:cNvPr id="2" name="Title 1"/>
+          <p:cNvSpPr>
+            <a:spLocks noGrp="1"/>
+          </p:cNvSpPr>
+          <p:nvPr>
+            <p:ph type="title"/>
+          </p:nvPr>
+        </p:nvSpPr>
+        <p:spPr/>
+        <p:txBody>
+          <a:bodyPr/>
+          <a:lstStyle/>
+          <a:p>
+            <a:r>
+              <a:rPr lang="en-US" dirty="0" smtClean="0"/>
+              <a:t>Summary</a:t>
+            </a:r>
+            <a:endParaRPr lang="en-US" dirty="0"/>
+          </a:p>
+        </p:txBody>
+      </p:sp>
+      <p:sp>
+        <p:nvSpPr>
+          <p:cNvPr id="3" name="Content Placeholder 2"/>
+          <p:cNvSpPr>
+            <a:spLocks noGrp="1"/>
+          </p:cNvSpPr>
+          <p:nvPr>
+            <p:ph idx="1"/>
+          </p:nvPr>
+        </p:nvSpPr>
+        <p:spPr/>
+        <p:txBody>
+          <a:bodyPr/>
+          <a:lstStyle/>
+          <a:p>
+            <a:pPr>
+              <a:buFont typeface="Wingdings" panose="05000000000000000000" pitchFamily="2" charset="2"/>
+              <a:buChar char="§"/>
+            </a:pPr>
+            <a:r>
+              <a:rPr lang="en-US" dirty="0" smtClean="0"/>
+              <a:t> Good Progress</a:t>
+            </a:r>
+          </a:p>
+          <a:p>
+            <a:pPr>
+              <a:buFont typeface="Wingdings" panose="05000000000000000000" pitchFamily="2" charset="2"/>
+              <a:buChar char="§"/>
+            </a:pPr>
+            <a:r>
+              <a:rPr lang="en-US" dirty="0"/>
+              <a:t> </a:t>
+            </a:r>
+            <a:r>
+              <a:rPr lang="en-US" dirty="0" smtClean="0"/>
+              <a:t>Everything is going has planned</a:t>
+            </a:r>
+          </a:p>
+          <a:p>
+            <a:pPr marL="0" indent="0">
+              <a:buNone/>
+            </a:pPr>
+            <a:endParaRPr lang="en-US" dirty="0" smtClean="0"/>
+          </a:p>
+        </p:txBody>
+      </p:sp>
+    </p:spTree>
+    <p:extLst>
+      <p:ext uri="{BB962C8B-B14F-4D97-AF65-F5344CB8AC3E}">
+        <p14:creationId xmlns:p14="http://schemas.microsoft.com/office/powerpoint/2010/main" val="2573628383"/>
+      </p:ext>
+    </p:extLst>
+  </p:cSld>
+  <p:clrMapOvr>
+    <a:masterClrMapping/>
+  </p:clrMapOvr>
+</p:sld>
+</file>
+
 <file path=ppt/slides/slide2.xml><?xml version="1.0" encoding="utf-8"?>
 <p:sld xmlns:a="http://schemas.openxmlformats.org/drawingml/2006/main" xmlns:r="http://schemas.openxmlformats.org/officeDocument/2006/relationships" xmlns:p="http://schemas.openxmlformats.org/presentationml/2006/main">
   <p:cSld>

</xml_diff>

<commit_message>
Added Problem description and scope of system
</commit_message>
<xml_diff>
--- a/Crimson Clubs (Design).pptx
+++ b/Crimson Clubs (Design).pptx
@@ -6,19 +6,20 @@
   </p:sldMasterIdLst>
   <p:sldIdLst>
     <p:sldId id="256" r:id="rId2"/>
-    <p:sldId id="257" r:id="rId3"/>
-    <p:sldId id="258" r:id="rId4"/>
-    <p:sldId id="259" r:id="rId5"/>
-    <p:sldId id="260" r:id="rId6"/>
-    <p:sldId id="261" r:id="rId7"/>
-    <p:sldId id="262" r:id="rId8"/>
-    <p:sldId id="263" r:id="rId9"/>
-    <p:sldId id="264" r:id="rId10"/>
-    <p:sldId id="265" r:id="rId11"/>
-    <p:sldId id="266" r:id="rId12"/>
-    <p:sldId id="268" r:id="rId13"/>
-    <p:sldId id="269" r:id="rId14"/>
-    <p:sldId id="270" r:id="rId15"/>
+    <p:sldId id="271" r:id="rId3"/>
+    <p:sldId id="257" r:id="rId4"/>
+    <p:sldId id="258" r:id="rId5"/>
+    <p:sldId id="259" r:id="rId6"/>
+    <p:sldId id="260" r:id="rId7"/>
+    <p:sldId id="261" r:id="rId8"/>
+    <p:sldId id="262" r:id="rId9"/>
+    <p:sldId id="263" r:id="rId10"/>
+    <p:sldId id="264" r:id="rId11"/>
+    <p:sldId id="265" r:id="rId12"/>
+    <p:sldId id="266" r:id="rId13"/>
+    <p:sldId id="268" r:id="rId14"/>
+    <p:sldId id="269" r:id="rId15"/>
+    <p:sldId id="270" r:id="rId16"/>
   </p:sldIdLst>
   <p:sldSz cx="12192000" cy="6858000"/>
   <p:notesSz cx="6858000" cy="9144000"/>
@@ -3928,7 +3929,7 @@
           <p:cNvPr id="2" name="Title 1">
             <a:extLst>
               <a:ext uri="{FF2B5EF4-FFF2-40B4-BE49-F238E27FC236}">
-                <a16:creationId xmlns:a16="http://schemas.microsoft.com/office/drawing/2014/main" id="{CA7EE062-4494-45DB-BA9B-9CA2CB786E29}"/>
+                <a16:creationId xmlns:a16="http://schemas.microsoft.com/office/drawing/2014/main" id="{9AA0BEBA-FC1B-4446-8ED7-F17F34A4859A}"/>
               </a:ext>
             </a:extLst>
           </p:cNvPr>
@@ -3942,7 +3943,7 @@
         <p:spPr>
           <a:xfrm>
             <a:off x="1097280" y="286603"/>
-            <a:ext cx="10058400" cy="672621"/>
+            <a:ext cx="10058400" cy="654691"/>
           </a:xfrm>
         </p:spPr>
         <p:txBody>
@@ -3953,7 +3954,7 @@
           <a:p>
             <a:r>
               <a:rPr lang="en-US" dirty="0"/>
-              <a:t>Search Clubs</a:t>
+              <a:t>Login Activity</a:t>
             </a:r>
           </a:p>
         </p:txBody>
@@ -3963,7 +3964,7 @@
           <p:cNvPr id="5" name="Content Placeholder 4">
             <a:extLst>
               <a:ext uri="{FF2B5EF4-FFF2-40B4-BE49-F238E27FC236}">
-                <a16:creationId xmlns:a16="http://schemas.microsoft.com/office/drawing/2014/main" id="{436A9987-A1DA-4158-A1D5-91580DAB95B9}"/>
+                <a16:creationId xmlns:a16="http://schemas.microsoft.com/office/drawing/2014/main" id="{D58929C8-5807-4349-813D-ADEBF8AD357C}"/>
               </a:ext>
             </a:extLst>
           </p:cNvPr>
@@ -3988,15 +3989,15 @@
         </p:blipFill>
         <p:spPr>
           <a:xfrm>
-            <a:off x="1278306" y="959224"/>
-            <a:ext cx="9542697" cy="5124917"/>
+            <a:off x="482942" y="1541930"/>
+            <a:ext cx="11525294" cy="3303918"/>
           </a:xfrm>
         </p:spPr>
       </p:pic>
     </p:spTree>
     <p:extLst>
       <p:ext uri="{BB962C8B-B14F-4D97-AF65-F5344CB8AC3E}">
-        <p14:creationId xmlns:p14="http://schemas.microsoft.com/office/powerpoint/2010/main" val="1319571923"/>
+        <p14:creationId xmlns:p14="http://schemas.microsoft.com/office/powerpoint/2010/main" val="117432679"/>
       </p:ext>
     </p:extLst>
   </p:cSld>
@@ -4028,7 +4029,7 @@
           <p:cNvPr id="2" name="Title 1">
             <a:extLst>
               <a:ext uri="{FF2B5EF4-FFF2-40B4-BE49-F238E27FC236}">
-                <a16:creationId xmlns:a16="http://schemas.microsoft.com/office/drawing/2014/main" id="{8EDCD3BF-7903-4346-8B47-791D45FC4964}"/>
+                <a16:creationId xmlns:a16="http://schemas.microsoft.com/office/drawing/2014/main" id="{CA7EE062-4494-45DB-BA9B-9CA2CB786E29}"/>
               </a:ext>
             </a:extLst>
           </p:cNvPr>
@@ -4041,8 +4042,8 @@
         </p:nvSpPr>
         <p:spPr>
           <a:xfrm>
-            <a:off x="1097280" y="286604"/>
-            <a:ext cx="10058400" cy="636762"/>
+            <a:off x="1097280" y="286603"/>
+            <a:ext cx="10058400" cy="672621"/>
           </a:xfrm>
         </p:spPr>
         <p:txBody>
@@ -4053,7 +4054,7 @@
           <a:p>
             <a:r>
               <a:rPr lang="en-US" dirty="0"/>
-              <a:t>View Event Statistics</a:t>
+              <a:t>Search Clubs</a:t>
             </a:r>
           </a:p>
         </p:txBody>
@@ -4063,7 +4064,7 @@
           <p:cNvPr id="5" name="Content Placeholder 4">
             <a:extLst>
               <a:ext uri="{FF2B5EF4-FFF2-40B4-BE49-F238E27FC236}">
-                <a16:creationId xmlns:a16="http://schemas.microsoft.com/office/drawing/2014/main" id="{BC6E59BA-FA16-48B4-A3BC-3AB7DDCB0F1E}"/>
+                <a16:creationId xmlns:a16="http://schemas.microsoft.com/office/drawing/2014/main" id="{436A9987-A1DA-4158-A1D5-91580DAB95B9}"/>
               </a:ext>
             </a:extLst>
           </p:cNvPr>
@@ -4088,15 +4089,15 @@
         </p:blipFill>
         <p:spPr>
           <a:xfrm>
-            <a:off x="1265205" y="923366"/>
-            <a:ext cx="9571703" cy="4945622"/>
+            <a:off x="1278306" y="959224"/>
+            <a:ext cx="9542697" cy="5124917"/>
           </a:xfrm>
         </p:spPr>
       </p:pic>
     </p:spTree>
     <p:extLst>
       <p:ext uri="{BB962C8B-B14F-4D97-AF65-F5344CB8AC3E}">
-        <p14:creationId xmlns:p14="http://schemas.microsoft.com/office/powerpoint/2010/main" val="3007085863"/>
+        <p14:creationId xmlns:p14="http://schemas.microsoft.com/office/powerpoint/2010/main" val="1319571923"/>
       </p:ext>
     </p:extLst>
   </p:cSld>
@@ -4128,7 +4129,7 @@
           <p:cNvPr id="2" name="Title 1">
             <a:extLst>
               <a:ext uri="{FF2B5EF4-FFF2-40B4-BE49-F238E27FC236}">
-                <a16:creationId xmlns:a16="http://schemas.microsoft.com/office/drawing/2014/main" id="{315BC2CF-9F6F-4594-9D86-98EAFF02B8F0}"/>
+                <a16:creationId xmlns:a16="http://schemas.microsoft.com/office/drawing/2014/main" id="{8EDCD3BF-7903-4346-8B47-791D45FC4964}"/>
               </a:ext>
             </a:extLst>
           </p:cNvPr>
@@ -4153,7 +4154,7 @@
           <a:p>
             <a:r>
               <a:rPr lang="en-US" dirty="0"/>
-              <a:t>View Calendar</a:t>
+              <a:t>View Event Statistics</a:t>
             </a:r>
           </a:p>
         </p:txBody>
@@ -4163,7 +4164,7 @@
           <p:cNvPr id="5" name="Content Placeholder 4">
             <a:extLst>
               <a:ext uri="{FF2B5EF4-FFF2-40B4-BE49-F238E27FC236}">
-                <a16:creationId xmlns:a16="http://schemas.microsoft.com/office/drawing/2014/main" id="{D412D30C-ABF5-4A19-B509-70AF20895314}"/>
+                <a16:creationId xmlns:a16="http://schemas.microsoft.com/office/drawing/2014/main" id="{BC6E59BA-FA16-48B4-A3BC-3AB7DDCB0F1E}"/>
               </a:ext>
             </a:extLst>
           </p:cNvPr>
@@ -4188,15 +4189,15 @@
         </p:blipFill>
         <p:spPr>
           <a:xfrm>
-            <a:off x="1602447" y="923366"/>
-            <a:ext cx="8566135" cy="4945622"/>
+            <a:off x="1265205" y="923366"/>
+            <a:ext cx="9571703" cy="4945622"/>
           </a:xfrm>
         </p:spPr>
       </p:pic>
     </p:spTree>
     <p:extLst>
       <p:ext uri="{BB962C8B-B14F-4D97-AF65-F5344CB8AC3E}">
-        <p14:creationId xmlns:p14="http://schemas.microsoft.com/office/powerpoint/2010/main" val="1336687778"/>
+        <p14:creationId xmlns:p14="http://schemas.microsoft.com/office/powerpoint/2010/main" val="3007085863"/>
       </p:ext>
     </p:extLst>
   </p:cSld>
@@ -4225,6 +4226,106 @@
       </p:grpSpPr>
       <p:sp>
         <p:nvSpPr>
+          <p:cNvPr id="2" name="Title 1">
+            <a:extLst>
+              <a:ext uri="{FF2B5EF4-FFF2-40B4-BE49-F238E27FC236}">
+                <a16:creationId xmlns:a16="http://schemas.microsoft.com/office/drawing/2014/main" id="{315BC2CF-9F6F-4594-9D86-98EAFF02B8F0}"/>
+              </a:ext>
+            </a:extLst>
+          </p:cNvPr>
+          <p:cNvSpPr>
+            <a:spLocks noGrp="1"/>
+          </p:cNvSpPr>
+          <p:nvPr>
+            <p:ph type="title"/>
+          </p:nvPr>
+        </p:nvSpPr>
+        <p:spPr>
+          <a:xfrm>
+            <a:off x="1097280" y="286604"/>
+            <a:ext cx="10058400" cy="636762"/>
+          </a:xfrm>
+        </p:spPr>
+        <p:txBody>
+          <a:bodyPr>
+            <a:normAutofit fontScale="90000"/>
+          </a:bodyPr>
+          <a:lstStyle/>
+          <a:p>
+            <a:r>
+              <a:rPr lang="en-US" dirty="0"/>
+              <a:t>View Calendar</a:t>
+            </a:r>
+          </a:p>
+        </p:txBody>
+      </p:sp>
+      <p:pic>
+        <p:nvPicPr>
+          <p:cNvPr id="5" name="Content Placeholder 4">
+            <a:extLst>
+              <a:ext uri="{FF2B5EF4-FFF2-40B4-BE49-F238E27FC236}">
+                <a16:creationId xmlns:a16="http://schemas.microsoft.com/office/drawing/2014/main" id="{D412D30C-ABF5-4A19-B509-70AF20895314}"/>
+              </a:ext>
+            </a:extLst>
+          </p:cNvPr>
+          <p:cNvPicPr>
+            <a:picLocks noGrp="1" noChangeAspect="1"/>
+          </p:cNvPicPr>
+          <p:nvPr>
+            <p:ph idx="1"/>
+          </p:nvPr>
+        </p:nvPicPr>
+        <p:blipFill>
+          <a:blip r:embed="rId2">
+            <a:extLst>
+              <a:ext uri="{28A0092B-C50C-407E-A947-70E740481C1C}">
+                <a14:useLocalDpi xmlns:a14="http://schemas.microsoft.com/office/drawing/2010/main" val="0"/>
+              </a:ext>
+            </a:extLst>
+          </a:blip>
+          <a:stretch>
+            <a:fillRect/>
+          </a:stretch>
+        </p:blipFill>
+        <p:spPr>
+          <a:xfrm>
+            <a:off x="1602447" y="923366"/>
+            <a:ext cx="8566135" cy="4945622"/>
+          </a:xfrm>
+        </p:spPr>
+      </p:pic>
+    </p:spTree>
+    <p:extLst>
+      <p:ext uri="{BB962C8B-B14F-4D97-AF65-F5344CB8AC3E}">
+        <p14:creationId xmlns:p14="http://schemas.microsoft.com/office/powerpoint/2010/main" val="1336687778"/>
+      </p:ext>
+    </p:extLst>
+  </p:cSld>
+  <p:clrMapOvr>
+    <a:masterClrMapping/>
+  </p:clrMapOvr>
+</p:sld>
+</file>
+
+<file path=ppt/slides/slide14.xml><?xml version="1.0" encoding="utf-8"?>
+<p:sld xmlns:a="http://schemas.openxmlformats.org/drawingml/2006/main" xmlns:r="http://schemas.openxmlformats.org/officeDocument/2006/relationships" xmlns:p="http://schemas.openxmlformats.org/presentationml/2006/main">
+  <p:cSld>
+    <p:spTree>
+      <p:nvGrpSpPr>
+        <p:cNvPr id="1" name=""/>
+        <p:cNvGrpSpPr/>
+        <p:nvPr/>
+      </p:nvGrpSpPr>
+      <p:grpSpPr>
+        <a:xfrm>
+          <a:off x="0" y="0"/>
+          <a:ext cx="0" cy="0"/>
+          <a:chOff x="0" y="0"/>
+          <a:chExt cx="0" cy="0"/>
+        </a:xfrm>
+      </p:grpSpPr>
+      <p:sp>
+        <p:nvSpPr>
           <p:cNvPr id="2" name="Title 1"/>
           <p:cNvSpPr>
             <a:spLocks noGrp="1"/>
@@ -4335,7 +4436,7 @@
 </p:sld>
 </file>
 
-<file path=ppt/slides/slide14.xml><?xml version="1.0" encoding="utf-8"?>
+<file path=ppt/slides/slide15.xml><?xml version="1.0" encoding="utf-8"?>
 <p:sld xmlns:a="http://schemas.openxmlformats.org/drawingml/2006/main" xmlns:r="http://schemas.openxmlformats.org/officeDocument/2006/relationships" xmlns:p="http://schemas.openxmlformats.org/presentationml/2006/main">
   <p:cSld>
     <p:spTree>
@@ -4453,13 +4554,7 @@
       </p:grpSpPr>
       <p:sp>
         <p:nvSpPr>
-          <p:cNvPr id="2" name="Title 1">
-            <a:extLst>
-              <a:ext uri="{FF2B5EF4-FFF2-40B4-BE49-F238E27FC236}">
-                <a16:creationId xmlns:a16="http://schemas.microsoft.com/office/drawing/2014/main" id="{ED37B926-014D-44FA-A053-ECE7E44ECED3}"/>
-              </a:ext>
-            </a:extLst>
-          </p:cNvPr>
+          <p:cNvPr id="2" name="Title 1"/>
           <p:cNvSpPr>
             <a:spLocks noGrp="1"/>
           </p:cNvSpPr>
@@ -4473,62 +4568,124 @@
           <a:lstStyle/>
           <a:p>
             <a:r>
+              <a:rPr lang="en-US" dirty="0" smtClean="0"/>
+              <a:t>Problem Description</a:t>
+            </a:r>
+            <a:endParaRPr lang="en-US" dirty="0"/>
+          </a:p>
+        </p:txBody>
+      </p:sp>
+      <p:sp>
+        <p:nvSpPr>
+          <p:cNvPr id="3" name="Content Placeholder 2"/>
+          <p:cNvSpPr>
+            <a:spLocks noGrp="1"/>
+          </p:cNvSpPr>
+          <p:nvPr>
+            <p:ph idx="1"/>
+          </p:nvPr>
+        </p:nvSpPr>
+        <p:spPr>
+          <a:xfrm>
+            <a:off x="1097280" y="1830235"/>
+            <a:ext cx="10058400" cy="4023360"/>
+          </a:xfrm>
+        </p:spPr>
+        <p:txBody>
+          <a:bodyPr/>
+          <a:lstStyle/>
+          <a:p>
+            <a:pPr>
+              <a:buFont typeface="Wingdings" panose="05000000000000000000" pitchFamily="2" charset="2"/>
+              <a:buChar char="§"/>
+            </a:pPr>
+            <a:r>
               <a:rPr lang="en-US" dirty="0"/>
-              <a:t>Recap</a:t>
-            </a:r>
-          </a:p>
-        </p:txBody>
-      </p:sp>
-      <p:sp>
-        <p:nvSpPr>
-          <p:cNvPr id="3" name="Content Placeholder 2">
-            <a:extLst>
-              <a:ext uri="{FF2B5EF4-FFF2-40B4-BE49-F238E27FC236}">
-                <a16:creationId xmlns:a16="http://schemas.microsoft.com/office/drawing/2014/main" id="{14147302-A239-42A5-A4B3-2C38028E5A0E}"/>
-              </a:ext>
-            </a:extLst>
-          </p:cNvPr>
-          <p:cNvSpPr>
-            <a:spLocks noGrp="1"/>
-          </p:cNvSpPr>
-          <p:nvPr>
-            <p:ph idx="1"/>
-          </p:nvPr>
-        </p:nvSpPr>
-        <p:spPr/>
-        <p:txBody>
-          <a:bodyPr/>
-          <a:lstStyle/>
-          <a:p>
-            <a:r>
-              <a:rPr lang="en-US" sz="2800" dirty="0"/>
-              <a:t>Manage clubs and teams</a:t>
-            </a:r>
-          </a:p>
-          <a:p>
-            <a:r>
-              <a:rPr lang="en-US" sz="2800" dirty="0"/>
-              <a:t>Receive push notifications to your phone</a:t>
-            </a:r>
-          </a:p>
-          <a:p>
-            <a:r>
-              <a:rPr lang="en-US" sz="2800" dirty="0"/>
-              <a:t>View calendar of events</a:t>
-            </a:r>
-          </a:p>
-          <a:p>
-            <a:endParaRPr lang="en-US" dirty="0"/>
-          </a:p>
-          <a:p>
-            <a:endParaRPr lang="en-US" dirty="0"/>
+              <a:t> </a:t>
+            </a:r>
+            <a:r>
+              <a:rPr lang="en-US" dirty="0" smtClean="0"/>
+              <a:t>None </a:t>
+            </a:r>
+            <a:r>
+              <a:rPr lang="en-US" smtClean="0"/>
+              <a:t>existent quality club </a:t>
+            </a:r>
+            <a:r>
+              <a:rPr lang="en-US" dirty="0" smtClean="0"/>
+              <a:t>and intramural calendar and statistical tracking</a:t>
+            </a:r>
+          </a:p>
+          <a:p>
+            <a:pPr>
+              <a:buFont typeface="Wingdings" panose="05000000000000000000" pitchFamily="2" charset="2"/>
+              <a:buChar char="§"/>
+            </a:pPr>
+            <a:r>
+              <a:rPr lang="en-US" dirty="0" smtClean="0"/>
+              <a:t> Poor existing applications/solutions</a:t>
+            </a:r>
+          </a:p>
+          <a:p>
+            <a:pPr lvl="1">
+              <a:buFont typeface="Wingdings" panose="05000000000000000000" pitchFamily="2" charset="2"/>
+              <a:buChar char="§"/>
+            </a:pPr>
+            <a:r>
+              <a:rPr lang="en-US" dirty="0" smtClean="0"/>
+              <a:t>Hard to use</a:t>
+            </a:r>
+          </a:p>
+          <a:p>
+            <a:pPr lvl="1">
+              <a:buFont typeface="Wingdings" panose="05000000000000000000" pitchFamily="2" charset="2"/>
+              <a:buChar char="§"/>
+            </a:pPr>
+            <a:r>
+              <a:rPr lang="en-US" dirty="0" smtClean="0"/>
+              <a:t>Slow</a:t>
+            </a:r>
+          </a:p>
+          <a:p>
+            <a:pPr lvl="1">
+              <a:buFont typeface="Wingdings" panose="05000000000000000000" pitchFamily="2" charset="2"/>
+              <a:buChar char="§"/>
+            </a:pPr>
+            <a:r>
+              <a:rPr lang="en-US" dirty="0" smtClean="0"/>
+              <a:t>Poor user experience</a:t>
+            </a:r>
+          </a:p>
+          <a:p>
+            <a:pPr lvl="1">
+              <a:buFont typeface="Wingdings" panose="05000000000000000000" pitchFamily="2" charset="2"/>
+              <a:buChar char="§"/>
+            </a:pPr>
+            <a:r>
+              <a:rPr lang="en-US" dirty="0" smtClean="0"/>
+              <a:t>Intrusive Advertisements</a:t>
+            </a:r>
+          </a:p>
+          <a:p>
+            <a:pPr lvl="1">
+              <a:buFont typeface="Wingdings" panose="05000000000000000000" pitchFamily="2" charset="2"/>
+              <a:buChar char="§"/>
+            </a:pPr>
+            <a:endParaRPr lang="en-US" dirty="0" smtClean="0"/>
+          </a:p>
+          <a:p>
+            <a:pPr lvl="1">
+              <a:buFont typeface="Wingdings" panose="05000000000000000000" pitchFamily="2" charset="2"/>
+              <a:buChar char="§"/>
+            </a:pPr>
+            <a:endParaRPr lang="en-US" dirty="0" smtClean="0"/>
           </a:p>
         </p:txBody>
       </p:sp>
     </p:spTree>
     <p:extLst>
       <p:ext uri="{BB962C8B-B14F-4D97-AF65-F5344CB8AC3E}">
-        <p14:creationId xmlns:p14="http://schemas.microsoft.com/office/powerpoint/2010/main" val="3694367311"/>
+        <p14:creationId xmlns:p14="http://schemas.microsoft.com/office/powerpoint/2010/main" val="1323524367"/>
       </p:ext>
     </p:extLst>
   </p:cSld>
@@ -4560,7 +4717,7 @@
           <p:cNvPr id="2" name="Title 1">
             <a:extLst>
               <a:ext uri="{FF2B5EF4-FFF2-40B4-BE49-F238E27FC236}">
-                <a16:creationId xmlns:a16="http://schemas.microsoft.com/office/drawing/2014/main" id="{06B93333-0B7F-4731-8A58-3C7A4877C3F7}"/>
+                <a16:creationId xmlns:a16="http://schemas.microsoft.com/office/drawing/2014/main" id="{ED37B926-014D-44FA-A053-ECE7E44ECED3}"/>
               </a:ext>
             </a:extLst>
           </p:cNvPr>
@@ -4571,64 +4728,69 @@
             <p:ph type="title"/>
           </p:nvPr>
         </p:nvSpPr>
-        <p:spPr>
-          <a:xfrm>
-            <a:off x="1097280" y="286604"/>
-            <a:ext cx="10058400" cy="645726"/>
-          </a:xfrm>
-        </p:spPr>
-        <p:txBody>
-          <a:bodyPr>
-            <a:normAutofit fontScale="90000"/>
-          </a:bodyPr>
-          <a:lstStyle/>
-          <a:p>
-            <a:r>
-              <a:rPr lang="en-US" dirty="0"/>
-              <a:t>Class Diagram</a:t>
-            </a:r>
-          </a:p>
-        </p:txBody>
-      </p:sp>
-      <p:pic>
-        <p:nvPicPr>
-          <p:cNvPr id="5" name="Content Placeholder 4">
+        <p:spPr/>
+        <p:txBody>
+          <a:bodyPr/>
+          <a:lstStyle/>
+          <a:p>
+            <a:r>
+              <a:rPr lang="en-US" dirty="0" smtClean="0"/>
+              <a:t>Scope of System</a:t>
+            </a:r>
+            <a:endParaRPr lang="en-US" dirty="0"/>
+          </a:p>
+        </p:txBody>
+      </p:sp>
+      <p:sp>
+        <p:nvSpPr>
+          <p:cNvPr id="3" name="Content Placeholder 2">
             <a:extLst>
               <a:ext uri="{FF2B5EF4-FFF2-40B4-BE49-F238E27FC236}">
-                <a16:creationId xmlns:a16="http://schemas.microsoft.com/office/drawing/2014/main" id="{4B984712-5FDF-4368-915F-5018E0784224}"/>
+                <a16:creationId xmlns:a16="http://schemas.microsoft.com/office/drawing/2014/main" id="{14147302-A239-42A5-A4B3-2C38028E5A0E}"/>
               </a:ext>
             </a:extLst>
           </p:cNvPr>
-          <p:cNvPicPr>
-            <a:picLocks noGrp="1" noChangeAspect="1"/>
-          </p:cNvPicPr>
+          <p:cNvSpPr>
+            <a:spLocks noGrp="1"/>
+          </p:cNvSpPr>
           <p:nvPr>
             <p:ph idx="1"/>
           </p:nvPr>
-        </p:nvPicPr>
-        <p:blipFill>
-          <a:blip r:embed="rId2">
-            <a:extLst>
-              <a:ext uri="{28A0092B-C50C-407E-A947-70E740481C1C}">
-                <a14:useLocalDpi xmlns:a14="http://schemas.microsoft.com/office/drawing/2010/main" val="0"/>
-              </a:ext>
-            </a:extLst>
-          </a:blip>
-          <a:stretch>
-            <a:fillRect/>
-          </a:stretch>
-        </p:blipFill>
-        <p:spPr>
-          <a:xfrm>
-            <a:off x="2054447" y="932330"/>
-            <a:ext cx="8012918" cy="5104616"/>
-          </a:xfrm>
-        </p:spPr>
-      </p:pic>
+        </p:nvSpPr>
+        <p:spPr/>
+        <p:txBody>
+          <a:bodyPr/>
+          <a:lstStyle/>
+          <a:p>
+            <a:r>
+              <a:rPr lang="en-US" sz="2800" dirty="0"/>
+              <a:t>Manage clubs and teams</a:t>
+            </a:r>
+          </a:p>
+          <a:p>
+            <a:r>
+              <a:rPr lang="en-US" sz="2800" dirty="0"/>
+              <a:t>Receive push notifications to your phone</a:t>
+            </a:r>
+          </a:p>
+          <a:p>
+            <a:r>
+              <a:rPr lang="en-US" sz="2800" dirty="0"/>
+              <a:t>View calendar of events</a:t>
+            </a:r>
+          </a:p>
+          <a:p>
+            <a:endParaRPr lang="en-US" dirty="0"/>
+          </a:p>
+          <a:p>
+            <a:endParaRPr lang="en-US" dirty="0"/>
+          </a:p>
+        </p:txBody>
+      </p:sp>
     </p:spTree>
     <p:extLst>
       <p:ext uri="{BB962C8B-B14F-4D97-AF65-F5344CB8AC3E}">
-        <p14:creationId xmlns:p14="http://schemas.microsoft.com/office/powerpoint/2010/main" val="2625072206"/>
+        <p14:creationId xmlns:p14="http://schemas.microsoft.com/office/powerpoint/2010/main" val="3694367311"/>
       </p:ext>
     </p:extLst>
   </p:cSld>
@@ -4660,7 +4822,7 @@
           <p:cNvPr id="2" name="Title 1">
             <a:extLst>
               <a:ext uri="{FF2B5EF4-FFF2-40B4-BE49-F238E27FC236}">
-                <a16:creationId xmlns:a16="http://schemas.microsoft.com/office/drawing/2014/main" id="{5CAB6557-1CDC-4939-AC62-036353EDBA57}"/>
+                <a16:creationId xmlns:a16="http://schemas.microsoft.com/office/drawing/2014/main" id="{06B93333-0B7F-4731-8A58-3C7A4877C3F7}"/>
               </a:ext>
             </a:extLst>
           </p:cNvPr>
@@ -4673,17 +4835,19 @@
         </p:nvSpPr>
         <p:spPr>
           <a:xfrm>
-            <a:off x="1097280" y="286603"/>
-            <a:ext cx="10058400" cy="807091"/>
-          </a:xfrm>
-        </p:spPr>
-        <p:txBody>
-          <a:bodyPr/>
+            <a:off x="1097280" y="286604"/>
+            <a:ext cx="10058400" cy="645726"/>
+          </a:xfrm>
+        </p:spPr>
+        <p:txBody>
+          <a:bodyPr>
+            <a:normAutofit fontScale="90000"/>
+          </a:bodyPr>
           <a:lstStyle/>
           <a:p>
             <a:r>
               <a:rPr lang="en-US" dirty="0"/>
-              <a:t>Create Profile</a:t>
+              <a:t>Class Diagram</a:t>
             </a:r>
           </a:p>
         </p:txBody>
@@ -4693,7 +4857,7 @@
           <p:cNvPr id="5" name="Content Placeholder 4">
             <a:extLst>
               <a:ext uri="{FF2B5EF4-FFF2-40B4-BE49-F238E27FC236}">
-                <a16:creationId xmlns:a16="http://schemas.microsoft.com/office/drawing/2014/main" id="{C348EC45-D08E-4A90-A2F1-B5B435F6178E}"/>
+                <a16:creationId xmlns:a16="http://schemas.microsoft.com/office/drawing/2014/main" id="{4B984712-5FDF-4368-915F-5018E0784224}"/>
               </a:ext>
             </a:extLst>
           </p:cNvPr>
@@ -4718,15 +4882,15 @@
         </p:blipFill>
         <p:spPr>
           <a:xfrm>
-            <a:off x="1389913" y="1245030"/>
-            <a:ext cx="9278088" cy="4632924"/>
+            <a:off x="2054447" y="932330"/>
+            <a:ext cx="8012918" cy="5104616"/>
           </a:xfrm>
         </p:spPr>
       </p:pic>
     </p:spTree>
     <p:extLst>
       <p:ext uri="{BB962C8B-B14F-4D97-AF65-F5344CB8AC3E}">
-        <p14:creationId xmlns:p14="http://schemas.microsoft.com/office/powerpoint/2010/main" val="1496137810"/>
+        <p14:creationId xmlns:p14="http://schemas.microsoft.com/office/powerpoint/2010/main" val="2625072206"/>
       </p:ext>
     </p:extLst>
   </p:cSld>
@@ -4758,7 +4922,7 @@
           <p:cNvPr id="2" name="Title 1">
             <a:extLst>
               <a:ext uri="{FF2B5EF4-FFF2-40B4-BE49-F238E27FC236}">
-                <a16:creationId xmlns:a16="http://schemas.microsoft.com/office/drawing/2014/main" id="{A840D691-F4D5-42C8-85F4-FE4FBB395304}"/>
+                <a16:creationId xmlns:a16="http://schemas.microsoft.com/office/drawing/2014/main" id="{5CAB6557-1CDC-4939-AC62-036353EDBA57}"/>
               </a:ext>
             </a:extLst>
           </p:cNvPr>
@@ -4772,7 +4936,7 @@
         <p:spPr>
           <a:xfrm>
             <a:off x="1097280" y="286603"/>
-            <a:ext cx="10058400" cy="735373"/>
+            <a:ext cx="10058400" cy="807091"/>
           </a:xfrm>
         </p:spPr>
         <p:txBody>
@@ -4781,7 +4945,7 @@
           <a:p>
             <a:r>
               <a:rPr lang="en-US" dirty="0"/>
-              <a:t>Create Club</a:t>
+              <a:t>Create Profile</a:t>
             </a:r>
           </a:p>
         </p:txBody>
@@ -4791,7 +4955,7 @@
           <p:cNvPr id="5" name="Content Placeholder 4">
             <a:extLst>
               <a:ext uri="{FF2B5EF4-FFF2-40B4-BE49-F238E27FC236}">
-                <a16:creationId xmlns:a16="http://schemas.microsoft.com/office/drawing/2014/main" id="{5463F9B5-F910-4CF6-89FC-140FF0C5ECBA}"/>
+                <a16:creationId xmlns:a16="http://schemas.microsoft.com/office/drawing/2014/main" id="{C348EC45-D08E-4A90-A2F1-B5B435F6178E}"/>
               </a:ext>
             </a:extLst>
           </p:cNvPr>
@@ -4816,15 +4980,15 @@
         </p:blipFill>
         <p:spPr>
           <a:xfrm>
-            <a:off x="1219838" y="1506070"/>
-            <a:ext cx="9813284" cy="3648529"/>
+            <a:off x="1389913" y="1245030"/>
+            <a:ext cx="9278088" cy="4632924"/>
           </a:xfrm>
         </p:spPr>
       </p:pic>
     </p:spTree>
     <p:extLst>
       <p:ext uri="{BB962C8B-B14F-4D97-AF65-F5344CB8AC3E}">
-        <p14:creationId xmlns:p14="http://schemas.microsoft.com/office/powerpoint/2010/main" val="798308918"/>
+        <p14:creationId xmlns:p14="http://schemas.microsoft.com/office/powerpoint/2010/main" val="1496137810"/>
       </p:ext>
     </p:extLst>
   </p:cSld>
@@ -4856,7 +5020,7 @@
           <p:cNvPr id="2" name="Title 1">
             <a:extLst>
               <a:ext uri="{FF2B5EF4-FFF2-40B4-BE49-F238E27FC236}">
-                <a16:creationId xmlns:a16="http://schemas.microsoft.com/office/drawing/2014/main" id="{1A5B2C31-61B9-43D3-8F41-50314B6A39D6}"/>
+                <a16:creationId xmlns:a16="http://schemas.microsoft.com/office/drawing/2014/main" id="{A840D691-F4D5-42C8-85F4-FE4FBB395304}"/>
               </a:ext>
             </a:extLst>
           </p:cNvPr>
@@ -4869,19 +5033,17 @@
         </p:nvSpPr>
         <p:spPr>
           <a:xfrm>
-            <a:off x="1097280" y="286604"/>
-            <a:ext cx="10058400" cy="663656"/>
-          </a:xfrm>
-        </p:spPr>
-        <p:txBody>
-          <a:bodyPr>
-            <a:normAutofit fontScale="90000"/>
-          </a:bodyPr>
+            <a:off x="1097280" y="286603"/>
+            <a:ext cx="10058400" cy="735373"/>
+          </a:xfrm>
+        </p:spPr>
+        <p:txBody>
+          <a:bodyPr/>
           <a:lstStyle/>
           <a:p>
             <a:r>
               <a:rPr lang="en-US" dirty="0"/>
-              <a:t>Create Event</a:t>
+              <a:t>Create Club</a:t>
             </a:r>
           </a:p>
         </p:txBody>
@@ -4891,7 +5053,7 @@
           <p:cNvPr id="5" name="Content Placeholder 4">
             <a:extLst>
               <a:ext uri="{FF2B5EF4-FFF2-40B4-BE49-F238E27FC236}">
-                <a16:creationId xmlns:a16="http://schemas.microsoft.com/office/drawing/2014/main" id="{96DE7A9B-F1C2-409A-A4F8-17D72E82B42D}"/>
+                <a16:creationId xmlns:a16="http://schemas.microsoft.com/office/drawing/2014/main" id="{5463F9B5-F910-4CF6-89FC-140FF0C5ECBA}"/>
               </a:ext>
             </a:extLst>
           </p:cNvPr>
@@ -4916,15 +5078,15 @@
         </p:blipFill>
         <p:spPr>
           <a:xfrm>
-            <a:off x="164827" y="1210235"/>
-            <a:ext cx="11690972" cy="4025154"/>
+            <a:off x="1219838" y="1506070"/>
+            <a:ext cx="9813284" cy="3648529"/>
           </a:xfrm>
         </p:spPr>
       </p:pic>
     </p:spTree>
     <p:extLst>
       <p:ext uri="{BB962C8B-B14F-4D97-AF65-F5344CB8AC3E}">
-        <p14:creationId xmlns:p14="http://schemas.microsoft.com/office/powerpoint/2010/main" val="963349387"/>
+        <p14:creationId xmlns:p14="http://schemas.microsoft.com/office/powerpoint/2010/main" val="798308918"/>
       </p:ext>
     </p:extLst>
   </p:cSld>
@@ -4956,7 +5118,7 @@
           <p:cNvPr id="2" name="Title 1">
             <a:extLst>
               <a:ext uri="{FF2B5EF4-FFF2-40B4-BE49-F238E27FC236}">
-                <a16:creationId xmlns:a16="http://schemas.microsoft.com/office/drawing/2014/main" id="{511E7CCA-A5FD-40A0-B51C-117B3F9B28F8}"/>
+                <a16:creationId xmlns:a16="http://schemas.microsoft.com/office/drawing/2014/main" id="{1A5B2C31-61B9-43D3-8F41-50314B6A39D6}"/>
               </a:ext>
             </a:extLst>
           </p:cNvPr>
@@ -4981,7 +5143,7 @@
           <a:p>
             <a:r>
               <a:rPr lang="en-US" dirty="0"/>
-              <a:t>Join Club</a:t>
+              <a:t>Create Event</a:t>
             </a:r>
           </a:p>
         </p:txBody>
@@ -4991,7 +5153,7 @@
           <p:cNvPr id="5" name="Content Placeholder 4">
             <a:extLst>
               <a:ext uri="{FF2B5EF4-FFF2-40B4-BE49-F238E27FC236}">
-                <a16:creationId xmlns:a16="http://schemas.microsoft.com/office/drawing/2014/main" id="{F3E17A34-B346-4CE0-B0C5-991228262EDB}"/>
+                <a16:creationId xmlns:a16="http://schemas.microsoft.com/office/drawing/2014/main" id="{96DE7A9B-F1C2-409A-A4F8-17D72E82B42D}"/>
               </a:ext>
             </a:extLst>
           </p:cNvPr>
@@ -5016,15 +5178,15 @@
         </p:blipFill>
         <p:spPr>
           <a:xfrm>
-            <a:off x="603434" y="950260"/>
-            <a:ext cx="11032754" cy="5142708"/>
+            <a:off x="164827" y="1210235"/>
+            <a:ext cx="11690972" cy="4025154"/>
           </a:xfrm>
         </p:spPr>
       </p:pic>
     </p:spTree>
     <p:extLst>
       <p:ext uri="{BB962C8B-B14F-4D97-AF65-F5344CB8AC3E}">
-        <p14:creationId xmlns:p14="http://schemas.microsoft.com/office/powerpoint/2010/main" val="3180704940"/>
+        <p14:creationId xmlns:p14="http://schemas.microsoft.com/office/powerpoint/2010/main" val="963349387"/>
       </p:ext>
     </p:extLst>
   </p:cSld>
@@ -5056,7 +5218,7 @@
           <p:cNvPr id="2" name="Title 1">
             <a:extLst>
               <a:ext uri="{FF2B5EF4-FFF2-40B4-BE49-F238E27FC236}">
-                <a16:creationId xmlns:a16="http://schemas.microsoft.com/office/drawing/2014/main" id="{02540FA4-77CF-4A56-9097-B9FE2C134D13}"/>
+                <a16:creationId xmlns:a16="http://schemas.microsoft.com/office/drawing/2014/main" id="{511E7CCA-A5FD-40A0-B51C-117B3F9B28F8}"/>
               </a:ext>
             </a:extLst>
           </p:cNvPr>
@@ -5081,7 +5243,7 @@
           <a:p>
             <a:r>
               <a:rPr lang="en-US" dirty="0"/>
-              <a:t>Leave Club</a:t>
+              <a:t>Join Club</a:t>
             </a:r>
           </a:p>
         </p:txBody>
@@ -5091,7 +5253,7 @@
           <p:cNvPr id="5" name="Content Placeholder 4">
             <a:extLst>
               <a:ext uri="{FF2B5EF4-FFF2-40B4-BE49-F238E27FC236}">
-                <a16:creationId xmlns:a16="http://schemas.microsoft.com/office/drawing/2014/main" id="{8808A8B9-9E47-4B82-9910-BA770C88A9B6}"/>
+                <a16:creationId xmlns:a16="http://schemas.microsoft.com/office/drawing/2014/main" id="{F3E17A34-B346-4CE0-B0C5-991228262EDB}"/>
               </a:ext>
             </a:extLst>
           </p:cNvPr>
@@ -5116,15 +5278,15 @@
         </p:blipFill>
         <p:spPr>
           <a:xfrm>
-            <a:off x="1484286" y="959226"/>
-            <a:ext cx="9005821" cy="4918728"/>
+            <a:off x="603434" y="950260"/>
+            <a:ext cx="11032754" cy="5142708"/>
           </a:xfrm>
         </p:spPr>
       </p:pic>
     </p:spTree>
     <p:extLst>
       <p:ext uri="{BB962C8B-B14F-4D97-AF65-F5344CB8AC3E}">
-        <p14:creationId xmlns:p14="http://schemas.microsoft.com/office/powerpoint/2010/main" val="835220665"/>
+        <p14:creationId xmlns:p14="http://schemas.microsoft.com/office/powerpoint/2010/main" val="3180704940"/>
       </p:ext>
     </p:extLst>
   </p:cSld>
@@ -5156,7 +5318,7 @@
           <p:cNvPr id="2" name="Title 1">
             <a:extLst>
               <a:ext uri="{FF2B5EF4-FFF2-40B4-BE49-F238E27FC236}">
-                <a16:creationId xmlns:a16="http://schemas.microsoft.com/office/drawing/2014/main" id="{9AA0BEBA-FC1B-4446-8ED7-F17F34A4859A}"/>
+                <a16:creationId xmlns:a16="http://schemas.microsoft.com/office/drawing/2014/main" id="{02540FA4-77CF-4A56-9097-B9FE2C134D13}"/>
               </a:ext>
             </a:extLst>
           </p:cNvPr>
@@ -5169,8 +5331,8 @@
         </p:nvSpPr>
         <p:spPr>
           <a:xfrm>
-            <a:off x="1097280" y="286603"/>
-            <a:ext cx="10058400" cy="654691"/>
+            <a:off x="1097280" y="286604"/>
+            <a:ext cx="10058400" cy="663656"/>
           </a:xfrm>
         </p:spPr>
         <p:txBody>
@@ -5181,7 +5343,7 @@
           <a:p>
             <a:r>
               <a:rPr lang="en-US" dirty="0"/>
-              <a:t>Login Activity</a:t>
+              <a:t>Leave Club</a:t>
             </a:r>
           </a:p>
         </p:txBody>
@@ -5191,7 +5353,7 @@
           <p:cNvPr id="5" name="Content Placeholder 4">
             <a:extLst>
               <a:ext uri="{FF2B5EF4-FFF2-40B4-BE49-F238E27FC236}">
-                <a16:creationId xmlns:a16="http://schemas.microsoft.com/office/drawing/2014/main" id="{D58929C8-5807-4349-813D-ADEBF8AD357C}"/>
+                <a16:creationId xmlns:a16="http://schemas.microsoft.com/office/drawing/2014/main" id="{8808A8B9-9E47-4B82-9910-BA770C88A9B6}"/>
               </a:ext>
             </a:extLst>
           </p:cNvPr>
@@ -5216,15 +5378,15 @@
         </p:blipFill>
         <p:spPr>
           <a:xfrm>
-            <a:off x="482942" y="1541930"/>
-            <a:ext cx="11525294" cy="3303918"/>
+            <a:off x="1484286" y="959226"/>
+            <a:ext cx="9005821" cy="4918728"/>
           </a:xfrm>
         </p:spPr>
       </p:pic>
     </p:spTree>
     <p:extLst>
       <p:ext uri="{BB962C8B-B14F-4D97-AF65-F5344CB8AC3E}">
-        <p14:creationId xmlns:p14="http://schemas.microsoft.com/office/powerpoint/2010/main" val="117432679"/>
+        <p14:creationId xmlns:p14="http://schemas.microsoft.com/office/powerpoint/2010/main" val="835220665"/>
       </p:ext>
     </p:extLst>
   </p:cSld>

</xml_diff>

<commit_message>
Updated scope of system
</commit_message>
<xml_diff>
--- a/Crimson Clubs (Design).pptx
+++ b/Crimson Clubs (Design).pptx
@@ -4605,15 +4605,7 @@
             </a:r>
             <a:r>
               <a:rPr lang="en-US" dirty="0" smtClean="0"/>
-              <a:t>None </a:t>
-            </a:r>
-            <a:r>
-              <a:rPr lang="en-US" smtClean="0"/>
-              <a:t>existent quality club </a:t>
-            </a:r>
-            <a:r>
-              <a:rPr lang="en-US" dirty="0" smtClean="0"/>
-              <a:t>and intramural calendar and statistical tracking</a:t>
+              <a:t>None existent quality club and intramural calendar and statistical tracking</a:t>
             </a:r>
           </a:p>
           <a:p>
@@ -4762,22 +4754,54 @@
           <a:bodyPr/>
           <a:lstStyle/>
           <a:p>
+            <a:pPr>
+              <a:buFont typeface="Wingdings" panose="05000000000000000000" pitchFamily="2" charset="2"/>
+              <a:buChar char="§"/>
+            </a:pPr>
+            <a:r>
+              <a:rPr lang="en-US" sz="2800" dirty="0" smtClean="0"/>
+              <a:t> Manage clubs and teams</a:t>
+            </a:r>
+          </a:p>
+          <a:p>
+            <a:pPr>
+              <a:buFont typeface="Wingdings" panose="05000000000000000000" pitchFamily="2" charset="2"/>
+              <a:buChar char="§"/>
+            </a:pPr>
+            <a:r>
+              <a:rPr lang="en-US" sz="2800" dirty="0" smtClean="0"/>
+              <a:t> Receive push notifications to your phone</a:t>
+            </a:r>
+          </a:p>
+          <a:p>
+            <a:pPr>
+              <a:buFont typeface="Wingdings" panose="05000000000000000000" pitchFamily="2" charset="2"/>
+              <a:buChar char="§"/>
+            </a:pPr>
+            <a:r>
+              <a:rPr lang="en-US" sz="2800" dirty="0" smtClean="0"/>
+              <a:t> View calendar of events</a:t>
+            </a:r>
+          </a:p>
+          <a:p>
+            <a:pPr>
+              <a:buFont typeface="Wingdings" panose="05000000000000000000" pitchFamily="2" charset="2"/>
+              <a:buChar char="§"/>
+            </a:pPr>
             <a:r>
               <a:rPr lang="en-US" sz="2800" dirty="0"/>
-              <a:t>Manage clubs and teams</a:t>
-            </a:r>
-          </a:p>
-          <a:p>
-            <a:r>
-              <a:rPr lang="en-US" sz="2800" dirty="0"/>
-              <a:t>Receive push notifications to your phone</a:t>
-            </a:r>
-          </a:p>
-          <a:p>
-            <a:r>
-              <a:rPr lang="en-US" sz="2800" dirty="0"/>
-              <a:t>View calendar of events</a:t>
-            </a:r>
+              <a:t> </a:t>
+            </a:r>
+            <a:r>
+              <a:rPr lang="en-US" sz="2800" dirty="0" smtClean="0"/>
+              <a:t>Schedule events</a:t>
+            </a:r>
+          </a:p>
+          <a:p>
+            <a:pPr marL="0" indent="0">
+              <a:buNone/>
+            </a:pPr>
+            <a:endParaRPr lang="en-US" sz="2800" dirty="0" smtClean="0"/>
           </a:p>
           <a:p>
             <a:endParaRPr lang="en-US" dirty="0"/>

</xml_diff>

<commit_message>
- Added split class diagram slides to design ppt - Added .gitignore
</commit_message>
<xml_diff>
--- a/Crimson Clubs (Design).pptx
+++ b/Crimson Clubs (Design).pptx
@@ -9,17 +9,20 @@
     <p:sldId id="271" r:id="rId3"/>
     <p:sldId id="257" r:id="rId4"/>
     <p:sldId id="258" r:id="rId5"/>
-    <p:sldId id="259" r:id="rId6"/>
-    <p:sldId id="260" r:id="rId7"/>
-    <p:sldId id="261" r:id="rId8"/>
-    <p:sldId id="262" r:id="rId9"/>
-    <p:sldId id="263" r:id="rId10"/>
-    <p:sldId id="264" r:id="rId11"/>
-    <p:sldId id="265" r:id="rId12"/>
-    <p:sldId id="266" r:id="rId13"/>
-    <p:sldId id="268" r:id="rId14"/>
-    <p:sldId id="269" r:id="rId15"/>
-    <p:sldId id="270" r:id="rId16"/>
+    <p:sldId id="272" r:id="rId6"/>
+    <p:sldId id="273" r:id="rId7"/>
+    <p:sldId id="274" r:id="rId8"/>
+    <p:sldId id="259" r:id="rId9"/>
+    <p:sldId id="260" r:id="rId10"/>
+    <p:sldId id="261" r:id="rId11"/>
+    <p:sldId id="262" r:id="rId12"/>
+    <p:sldId id="263" r:id="rId13"/>
+    <p:sldId id="264" r:id="rId14"/>
+    <p:sldId id="265" r:id="rId15"/>
+    <p:sldId id="266" r:id="rId16"/>
+    <p:sldId id="268" r:id="rId17"/>
+    <p:sldId id="269" r:id="rId18"/>
+    <p:sldId id="270" r:id="rId19"/>
   </p:sldIdLst>
   <p:sldSz cx="12192000" cy="6858000"/>
   <p:notesSz cx="6858000" cy="9144000"/>
@@ -3929,7 +3932,7 @@
           <p:cNvPr id="2" name="Title 1">
             <a:extLst>
               <a:ext uri="{FF2B5EF4-FFF2-40B4-BE49-F238E27FC236}">
-                <a16:creationId xmlns:a16="http://schemas.microsoft.com/office/drawing/2014/main" id="{9AA0BEBA-FC1B-4446-8ED7-F17F34A4859A}"/>
+                <a16:creationId xmlns:a16="http://schemas.microsoft.com/office/drawing/2014/main" id="{1A5B2C31-61B9-43D3-8F41-50314B6A39D6}"/>
               </a:ext>
             </a:extLst>
           </p:cNvPr>
@@ -3942,8 +3945,8 @@
         </p:nvSpPr>
         <p:spPr>
           <a:xfrm>
-            <a:off x="1097280" y="286603"/>
-            <a:ext cx="10058400" cy="654691"/>
+            <a:off x="1097280" y="286604"/>
+            <a:ext cx="10058400" cy="663656"/>
           </a:xfrm>
         </p:spPr>
         <p:txBody>
@@ -3954,7 +3957,7 @@
           <a:p>
             <a:r>
               <a:rPr lang="en-US" dirty="0"/>
-              <a:t>Login Activity</a:t>
+              <a:t>Create Event</a:t>
             </a:r>
           </a:p>
         </p:txBody>
@@ -3964,7 +3967,7 @@
           <p:cNvPr id="5" name="Content Placeholder 4">
             <a:extLst>
               <a:ext uri="{FF2B5EF4-FFF2-40B4-BE49-F238E27FC236}">
-                <a16:creationId xmlns:a16="http://schemas.microsoft.com/office/drawing/2014/main" id="{D58929C8-5807-4349-813D-ADEBF8AD357C}"/>
+                <a16:creationId xmlns:a16="http://schemas.microsoft.com/office/drawing/2014/main" id="{96DE7A9B-F1C2-409A-A4F8-17D72E82B42D}"/>
               </a:ext>
             </a:extLst>
           </p:cNvPr>
@@ -3989,15 +3992,15 @@
         </p:blipFill>
         <p:spPr>
           <a:xfrm>
-            <a:off x="482942" y="1541930"/>
-            <a:ext cx="11525294" cy="3303918"/>
+            <a:off x="164827" y="1210235"/>
+            <a:ext cx="11690972" cy="4025154"/>
           </a:xfrm>
         </p:spPr>
       </p:pic>
     </p:spTree>
     <p:extLst>
       <p:ext uri="{BB962C8B-B14F-4D97-AF65-F5344CB8AC3E}">
-        <p14:creationId xmlns:p14="http://schemas.microsoft.com/office/powerpoint/2010/main" val="117432679"/>
+        <p14:creationId xmlns:p14="http://schemas.microsoft.com/office/powerpoint/2010/main" val="963349387"/>
       </p:ext>
     </p:extLst>
   </p:cSld>
@@ -4029,7 +4032,7 @@
           <p:cNvPr id="2" name="Title 1">
             <a:extLst>
               <a:ext uri="{FF2B5EF4-FFF2-40B4-BE49-F238E27FC236}">
-                <a16:creationId xmlns:a16="http://schemas.microsoft.com/office/drawing/2014/main" id="{CA7EE062-4494-45DB-BA9B-9CA2CB786E29}"/>
+                <a16:creationId xmlns:a16="http://schemas.microsoft.com/office/drawing/2014/main" id="{511E7CCA-A5FD-40A0-B51C-117B3F9B28F8}"/>
               </a:ext>
             </a:extLst>
           </p:cNvPr>
@@ -4042,8 +4045,8 @@
         </p:nvSpPr>
         <p:spPr>
           <a:xfrm>
-            <a:off x="1097280" y="286603"/>
-            <a:ext cx="10058400" cy="672621"/>
+            <a:off x="1097280" y="286604"/>
+            <a:ext cx="10058400" cy="663656"/>
           </a:xfrm>
         </p:spPr>
         <p:txBody>
@@ -4054,7 +4057,7 @@
           <a:p>
             <a:r>
               <a:rPr lang="en-US" dirty="0"/>
-              <a:t>Search Clubs</a:t>
+              <a:t>Join Club</a:t>
             </a:r>
           </a:p>
         </p:txBody>
@@ -4064,7 +4067,7 @@
           <p:cNvPr id="5" name="Content Placeholder 4">
             <a:extLst>
               <a:ext uri="{FF2B5EF4-FFF2-40B4-BE49-F238E27FC236}">
-                <a16:creationId xmlns:a16="http://schemas.microsoft.com/office/drawing/2014/main" id="{436A9987-A1DA-4158-A1D5-91580DAB95B9}"/>
+                <a16:creationId xmlns:a16="http://schemas.microsoft.com/office/drawing/2014/main" id="{F3E17A34-B346-4CE0-B0C5-991228262EDB}"/>
               </a:ext>
             </a:extLst>
           </p:cNvPr>
@@ -4089,15 +4092,15 @@
         </p:blipFill>
         <p:spPr>
           <a:xfrm>
-            <a:off x="1278306" y="959224"/>
-            <a:ext cx="9542697" cy="5124917"/>
+            <a:off x="603434" y="950260"/>
+            <a:ext cx="11032754" cy="5142708"/>
           </a:xfrm>
         </p:spPr>
       </p:pic>
     </p:spTree>
     <p:extLst>
       <p:ext uri="{BB962C8B-B14F-4D97-AF65-F5344CB8AC3E}">
-        <p14:creationId xmlns:p14="http://schemas.microsoft.com/office/powerpoint/2010/main" val="1319571923"/>
+        <p14:creationId xmlns:p14="http://schemas.microsoft.com/office/powerpoint/2010/main" val="3180704940"/>
       </p:ext>
     </p:extLst>
   </p:cSld>
@@ -4129,7 +4132,7 @@
           <p:cNvPr id="2" name="Title 1">
             <a:extLst>
               <a:ext uri="{FF2B5EF4-FFF2-40B4-BE49-F238E27FC236}">
-                <a16:creationId xmlns:a16="http://schemas.microsoft.com/office/drawing/2014/main" id="{8EDCD3BF-7903-4346-8B47-791D45FC4964}"/>
+                <a16:creationId xmlns:a16="http://schemas.microsoft.com/office/drawing/2014/main" id="{02540FA4-77CF-4A56-9097-B9FE2C134D13}"/>
               </a:ext>
             </a:extLst>
           </p:cNvPr>
@@ -4143,7 +4146,7 @@
         <p:spPr>
           <a:xfrm>
             <a:off x="1097280" y="286604"/>
-            <a:ext cx="10058400" cy="636762"/>
+            <a:ext cx="10058400" cy="663656"/>
           </a:xfrm>
         </p:spPr>
         <p:txBody>
@@ -4154,7 +4157,7 @@
           <a:p>
             <a:r>
               <a:rPr lang="en-US" dirty="0"/>
-              <a:t>View Event Statistics</a:t>
+              <a:t>Leave Club</a:t>
             </a:r>
           </a:p>
         </p:txBody>
@@ -4164,7 +4167,7 @@
           <p:cNvPr id="5" name="Content Placeholder 4">
             <a:extLst>
               <a:ext uri="{FF2B5EF4-FFF2-40B4-BE49-F238E27FC236}">
-                <a16:creationId xmlns:a16="http://schemas.microsoft.com/office/drawing/2014/main" id="{BC6E59BA-FA16-48B4-A3BC-3AB7DDCB0F1E}"/>
+                <a16:creationId xmlns:a16="http://schemas.microsoft.com/office/drawing/2014/main" id="{8808A8B9-9E47-4B82-9910-BA770C88A9B6}"/>
               </a:ext>
             </a:extLst>
           </p:cNvPr>
@@ -4189,15 +4192,15 @@
         </p:blipFill>
         <p:spPr>
           <a:xfrm>
-            <a:off x="1265205" y="923366"/>
-            <a:ext cx="9571703" cy="4945622"/>
+            <a:off x="1484286" y="959226"/>
+            <a:ext cx="9005821" cy="4918728"/>
           </a:xfrm>
         </p:spPr>
       </p:pic>
     </p:spTree>
     <p:extLst>
       <p:ext uri="{BB962C8B-B14F-4D97-AF65-F5344CB8AC3E}">
-        <p14:creationId xmlns:p14="http://schemas.microsoft.com/office/powerpoint/2010/main" val="3007085863"/>
+        <p14:creationId xmlns:p14="http://schemas.microsoft.com/office/powerpoint/2010/main" val="835220665"/>
       </p:ext>
     </p:extLst>
   </p:cSld>
@@ -4229,7 +4232,7 @@
           <p:cNvPr id="2" name="Title 1">
             <a:extLst>
               <a:ext uri="{FF2B5EF4-FFF2-40B4-BE49-F238E27FC236}">
-                <a16:creationId xmlns:a16="http://schemas.microsoft.com/office/drawing/2014/main" id="{315BC2CF-9F6F-4594-9D86-98EAFF02B8F0}"/>
+                <a16:creationId xmlns:a16="http://schemas.microsoft.com/office/drawing/2014/main" id="{9AA0BEBA-FC1B-4446-8ED7-F17F34A4859A}"/>
               </a:ext>
             </a:extLst>
           </p:cNvPr>
@@ -4242,8 +4245,8 @@
         </p:nvSpPr>
         <p:spPr>
           <a:xfrm>
-            <a:off x="1097280" y="286604"/>
-            <a:ext cx="10058400" cy="636762"/>
+            <a:off x="1097280" y="286603"/>
+            <a:ext cx="10058400" cy="654691"/>
           </a:xfrm>
         </p:spPr>
         <p:txBody>
@@ -4254,7 +4257,7 @@
           <a:p>
             <a:r>
               <a:rPr lang="en-US" dirty="0"/>
-              <a:t>View Calendar</a:t>
+              <a:t>Login Activity</a:t>
             </a:r>
           </a:p>
         </p:txBody>
@@ -4264,7 +4267,7 @@
           <p:cNvPr id="5" name="Content Placeholder 4">
             <a:extLst>
               <a:ext uri="{FF2B5EF4-FFF2-40B4-BE49-F238E27FC236}">
-                <a16:creationId xmlns:a16="http://schemas.microsoft.com/office/drawing/2014/main" id="{D412D30C-ABF5-4A19-B509-70AF20895314}"/>
+                <a16:creationId xmlns:a16="http://schemas.microsoft.com/office/drawing/2014/main" id="{D58929C8-5807-4349-813D-ADEBF8AD357C}"/>
               </a:ext>
             </a:extLst>
           </p:cNvPr>
@@ -4289,15 +4292,15 @@
         </p:blipFill>
         <p:spPr>
           <a:xfrm>
-            <a:off x="1602447" y="923366"/>
-            <a:ext cx="8566135" cy="4945622"/>
+            <a:off x="482942" y="1541930"/>
+            <a:ext cx="11525294" cy="3303918"/>
           </a:xfrm>
         </p:spPr>
       </p:pic>
     </p:spTree>
     <p:extLst>
       <p:ext uri="{BB962C8B-B14F-4D97-AF65-F5344CB8AC3E}">
-        <p14:creationId xmlns:p14="http://schemas.microsoft.com/office/powerpoint/2010/main" val="1336687778"/>
+        <p14:creationId xmlns:p14="http://schemas.microsoft.com/office/powerpoint/2010/main" val="117432679"/>
       </p:ext>
     </p:extLst>
   </p:cSld>
@@ -4326,6 +4329,306 @@
       </p:grpSpPr>
       <p:sp>
         <p:nvSpPr>
+          <p:cNvPr id="2" name="Title 1">
+            <a:extLst>
+              <a:ext uri="{FF2B5EF4-FFF2-40B4-BE49-F238E27FC236}">
+                <a16:creationId xmlns:a16="http://schemas.microsoft.com/office/drawing/2014/main" id="{CA7EE062-4494-45DB-BA9B-9CA2CB786E29}"/>
+              </a:ext>
+            </a:extLst>
+          </p:cNvPr>
+          <p:cNvSpPr>
+            <a:spLocks noGrp="1"/>
+          </p:cNvSpPr>
+          <p:nvPr>
+            <p:ph type="title"/>
+          </p:nvPr>
+        </p:nvSpPr>
+        <p:spPr>
+          <a:xfrm>
+            <a:off x="1097280" y="286603"/>
+            <a:ext cx="10058400" cy="672621"/>
+          </a:xfrm>
+        </p:spPr>
+        <p:txBody>
+          <a:bodyPr>
+            <a:normAutofit fontScale="90000"/>
+          </a:bodyPr>
+          <a:lstStyle/>
+          <a:p>
+            <a:r>
+              <a:rPr lang="en-US" dirty="0"/>
+              <a:t>Search Clubs</a:t>
+            </a:r>
+          </a:p>
+        </p:txBody>
+      </p:sp>
+      <p:pic>
+        <p:nvPicPr>
+          <p:cNvPr id="5" name="Content Placeholder 4">
+            <a:extLst>
+              <a:ext uri="{FF2B5EF4-FFF2-40B4-BE49-F238E27FC236}">
+                <a16:creationId xmlns:a16="http://schemas.microsoft.com/office/drawing/2014/main" id="{436A9987-A1DA-4158-A1D5-91580DAB95B9}"/>
+              </a:ext>
+            </a:extLst>
+          </p:cNvPr>
+          <p:cNvPicPr>
+            <a:picLocks noGrp="1" noChangeAspect="1"/>
+          </p:cNvPicPr>
+          <p:nvPr>
+            <p:ph idx="1"/>
+          </p:nvPr>
+        </p:nvPicPr>
+        <p:blipFill>
+          <a:blip r:embed="rId2">
+            <a:extLst>
+              <a:ext uri="{28A0092B-C50C-407E-A947-70E740481C1C}">
+                <a14:useLocalDpi xmlns:a14="http://schemas.microsoft.com/office/drawing/2010/main" val="0"/>
+              </a:ext>
+            </a:extLst>
+          </a:blip>
+          <a:stretch>
+            <a:fillRect/>
+          </a:stretch>
+        </p:blipFill>
+        <p:spPr>
+          <a:xfrm>
+            <a:off x="1278306" y="959224"/>
+            <a:ext cx="9542697" cy="5124917"/>
+          </a:xfrm>
+        </p:spPr>
+      </p:pic>
+    </p:spTree>
+    <p:extLst>
+      <p:ext uri="{BB962C8B-B14F-4D97-AF65-F5344CB8AC3E}">
+        <p14:creationId xmlns:p14="http://schemas.microsoft.com/office/powerpoint/2010/main" val="1319571923"/>
+      </p:ext>
+    </p:extLst>
+  </p:cSld>
+  <p:clrMapOvr>
+    <a:masterClrMapping/>
+  </p:clrMapOvr>
+</p:sld>
+</file>
+
+<file path=ppt/slides/slide15.xml><?xml version="1.0" encoding="utf-8"?>
+<p:sld xmlns:a="http://schemas.openxmlformats.org/drawingml/2006/main" xmlns:r="http://schemas.openxmlformats.org/officeDocument/2006/relationships" xmlns:p="http://schemas.openxmlformats.org/presentationml/2006/main">
+  <p:cSld>
+    <p:spTree>
+      <p:nvGrpSpPr>
+        <p:cNvPr id="1" name=""/>
+        <p:cNvGrpSpPr/>
+        <p:nvPr/>
+      </p:nvGrpSpPr>
+      <p:grpSpPr>
+        <a:xfrm>
+          <a:off x="0" y="0"/>
+          <a:ext cx="0" cy="0"/>
+          <a:chOff x="0" y="0"/>
+          <a:chExt cx="0" cy="0"/>
+        </a:xfrm>
+      </p:grpSpPr>
+      <p:sp>
+        <p:nvSpPr>
+          <p:cNvPr id="2" name="Title 1">
+            <a:extLst>
+              <a:ext uri="{FF2B5EF4-FFF2-40B4-BE49-F238E27FC236}">
+                <a16:creationId xmlns:a16="http://schemas.microsoft.com/office/drawing/2014/main" id="{8EDCD3BF-7903-4346-8B47-791D45FC4964}"/>
+              </a:ext>
+            </a:extLst>
+          </p:cNvPr>
+          <p:cNvSpPr>
+            <a:spLocks noGrp="1"/>
+          </p:cNvSpPr>
+          <p:nvPr>
+            <p:ph type="title"/>
+          </p:nvPr>
+        </p:nvSpPr>
+        <p:spPr>
+          <a:xfrm>
+            <a:off x="1097280" y="286604"/>
+            <a:ext cx="10058400" cy="636762"/>
+          </a:xfrm>
+        </p:spPr>
+        <p:txBody>
+          <a:bodyPr>
+            <a:normAutofit fontScale="90000"/>
+          </a:bodyPr>
+          <a:lstStyle/>
+          <a:p>
+            <a:r>
+              <a:rPr lang="en-US" dirty="0"/>
+              <a:t>View Event Statistics</a:t>
+            </a:r>
+          </a:p>
+        </p:txBody>
+      </p:sp>
+      <p:pic>
+        <p:nvPicPr>
+          <p:cNvPr id="5" name="Content Placeholder 4">
+            <a:extLst>
+              <a:ext uri="{FF2B5EF4-FFF2-40B4-BE49-F238E27FC236}">
+                <a16:creationId xmlns:a16="http://schemas.microsoft.com/office/drawing/2014/main" id="{BC6E59BA-FA16-48B4-A3BC-3AB7DDCB0F1E}"/>
+              </a:ext>
+            </a:extLst>
+          </p:cNvPr>
+          <p:cNvPicPr>
+            <a:picLocks noGrp="1" noChangeAspect="1"/>
+          </p:cNvPicPr>
+          <p:nvPr>
+            <p:ph idx="1"/>
+          </p:nvPr>
+        </p:nvPicPr>
+        <p:blipFill>
+          <a:blip r:embed="rId2">
+            <a:extLst>
+              <a:ext uri="{28A0092B-C50C-407E-A947-70E740481C1C}">
+                <a14:useLocalDpi xmlns:a14="http://schemas.microsoft.com/office/drawing/2010/main" val="0"/>
+              </a:ext>
+            </a:extLst>
+          </a:blip>
+          <a:stretch>
+            <a:fillRect/>
+          </a:stretch>
+        </p:blipFill>
+        <p:spPr>
+          <a:xfrm>
+            <a:off x="1265205" y="923366"/>
+            <a:ext cx="9571703" cy="4945622"/>
+          </a:xfrm>
+        </p:spPr>
+      </p:pic>
+    </p:spTree>
+    <p:extLst>
+      <p:ext uri="{BB962C8B-B14F-4D97-AF65-F5344CB8AC3E}">
+        <p14:creationId xmlns:p14="http://schemas.microsoft.com/office/powerpoint/2010/main" val="3007085863"/>
+      </p:ext>
+    </p:extLst>
+  </p:cSld>
+  <p:clrMapOvr>
+    <a:masterClrMapping/>
+  </p:clrMapOvr>
+</p:sld>
+</file>
+
+<file path=ppt/slides/slide16.xml><?xml version="1.0" encoding="utf-8"?>
+<p:sld xmlns:a="http://schemas.openxmlformats.org/drawingml/2006/main" xmlns:r="http://schemas.openxmlformats.org/officeDocument/2006/relationships" xmlns:p="http://schemas.openxmlformats.org/presentationml/2006/main">
+  <p:cSld>
+    <p:spTree>
+      <p:nvGrpSpPr>
+        <p:cNvPr id="1" name=""/>
+        <p:cNvGrpSpPr/>
+        <p:nvPr/>
+      </p:nvGrpSpPr>
+      <p:grpSpPr>
+        <a:xfrm>
+          <a:off x="0" y="0"/>
+          <a:ext cx="0" cy="0"/>
+          <a:chOff x="0" y="0"/>
+          <a:chExt cx="0" cy="0"/>
+        </a:xfrm>
+      </p:grpSpPr>
+      <p:sp>
+        <p:nvSpPr>
+          <p:cNvPr id="2" name="Title 1">
+            <a:extLst>
+              <a:ext uri="{FF2B5EF4-FFF2-40B4-BE49-F238E27FC236}">
+                <a16:creationId xmlns:a16="http://schemas.microsoft.com/office/drawing/2014/main" id="{315BC2CF-9F6F-4594-9D86-98EAFF02B8F0}"/>
+              </a:ext>
+            </a:extLst>
+          </p:cNvPr>
+          <p:cNvSpPr>
+            <a:spLocks noGrp="1"/>
+          </p:cNvSpPr>
+          <p:nvPr>
+            <p:ph type="title"/>
+          </p:nvPr>
+        </p:nvSpPr>
+        <p:spPr>
+          <a:xfrm>
+            <a:off x="1097280" y="286604"/>
+            <a:ext cx="10058400" cy="636762"/>
+          </a:xfrm>
+        </p:spPr>
+        <p:txBody>
+          <a:bodyPr>
+            <a:normAutofit fontScale="90000"/>
+          </a:bodyPr>
+          <a:lstStyle/>
+          <a:p>
+            <a:r>
+              <a:rPr lang="en-US" dirty="0"/>
+              <a:t>View Calendar</a:t>
+            </a:r>
+          </a:p>
+        </p:txBody>
+      </p:sp>
+      <p:pic>
+        <p:nvPicPr>
+          <p:cNvPr id="5" name="Content Placeholder 4">
+            <a:extLst>
+              <a:ext uri="{FF2B5EF4-FFF2-40B4-BE49-F238E27FC236}">
+                <a16:creationId xmlns:a16="http://schemas.microsoft.com/office/drawing/2014/main" id="{D412D30C-ABF5-4A19-B509-70AF20895314}"/>
+              </a:ext>
+            </a:extLst>
+          </p:cNvPr>
+          <p:cNvPicPr>
+            <a:picLocks noGrp="1" noChangeAspect="1"/>
+          </p:cNvPicPr>
+          <p:nvPr>
+            <p:ph idx="1"/>
+          </p:nvPr>
+        </p:nvPicPr>
+        <p:blipFill>
+          <a:blip r:embed="rId2">
+            <a:extLst>
+              <a:ext uri="{28A0092B-C50C-407E-A947-70E740481C1C}">
+                <a14:useLocalDpi xmlns:a14="http://schemas.microsoft.com/office/drawing/2010/main" val="0"/>
+              </a:ext>
+            </a:extLst>
+          </a:blip>
+          <a:stretch>
+            <a:fillRect/>
+          </a:stretch>
+        </p:blipFill>
+        <p:spPr>
+          <a:xfrm>
+            <a:off x="1602447" y="923366"/>
+            <a:ext cx="8566135" cy="4945622"/>
+          </a:xfrm>
+        </p:spPr>
+      </p:pic>
+    </p:spTree>
+    <p:extLst>
+      <p:ext uri="{BB962C8B-B14F-4D97-AF65-F5344CB8AC3E}">
+        <p14:creationId xmlns:p14="http://schemas.microsoft.com/office/powerpoint/2010/main" val="1336687778"/>
+      </p:ext>
+    </p:extLst>
+  </p:cSld>
+  <p:clrMapOvr>
+    <a:masterClrMapping/>
+  </p:clrMapOvr>
+</p:sld>
+</file>
+
+<file path=ppt/slides/slide17.xml><?xml version="1.0" encoding="utf-8"?>
+<p:sld xmlns:a="http://schemas.openxmlformats.org/drawingml/2006/main" xmlns:r="http://schemas.openxmlformats.org/officeDocument/2006/relationships" xmlns:p="http://schemas.openxmlformats.org/presentationml/2006/main">
+  <p:cSld>
+    <p:spTree>
+      <p:nvGrpSpPr>
+        <p:cNvPr id="1" name=""/>
+        <p:cNvGrpSpPr/>
+        <p:nvPr/>
+      </p:nvGrpSpPr>
+      <p:grpSpPr>
+        <a:xfrm>
+          <a:off x="0" y="0"/>
+          <a:ext cx="0" cy="0"/>
+          <a:chOff x="0" y="0"/>
+          <a:chExt cx="0" cy="0"/>
+        </a:xfrm>
+      </p:grpSpPr>
+      <p:sp>
+        <p:nvSpPr>
           <p:cNvPr id="2" name="Title 1"/>
           <p:cNvSpPr>
             <a:spLocks noGrp="1"/>
@@ -4436,7 +4739,7 @@
 </p:sld>
 </file>
 
-<file path=ppt/slides/slide15.xml><?xml version="1.0" encoding="utf-8"?>
+<file path=ppt/slides/slide18.xml><?xml version="1.0" encoding="utf-8"?>
 <p:sld xmlns:a="http://schemas.openxmlformats.org/drawingml/2006/main" xmlns:r="http://schemas.openxmlformats.org/officeDocument/2006/relationships" xmlns:p="http://schemas.openxmlformats.org/presentationml/2006/main">
   <p:cSld>
     <p:spTree>
@@ -4605,7 +4908,15 @@
             </a:r>
             <a:r>
               <a:rPr lang="en-US" dirty="0" smtClean="0"/>
-              <a:t>None existent quality club and intramural calendar and statistical tracking</a:t>
+              <a:t>None </a:t>
+            </a:r>
+            <a:r>
+              <a:rPr lang="en-US" smtClean="0"/>
+              <a:t>existent quality club </a:t>
+            </a:r>
+            <a:r>
+              <a:rPr lang="en-US" dirty="0" smtClean="0"/>
+              <a:t>and intramural calendar and statistical tracking</a:t>
             </a:r>
           </a:p>
           <a:p>
@@ -4754,54 +5065,22 @@
           <a:bodyPr/>
           <a:lstStyle/>
           <a:p>
-            <a:pPr>
-              <a:buFont typeface="Wingdings" panose="05000000000000000000" pitchFamily="2" charset="2"/>
-              <a:buChar char="§"/>
-            </a:pPr>
-            <a:r>
-              <a:rPr lang="en-US" sz="2800" dirty="0" smtClean="0"/>
-              <a:t> Manage clubs and teams</a:t>
-            </a:r>
-          </a:p>
-          <a:p>
-            <a:pPr>
-              <a:buFont typeface="Wingdings" panose="05000000000000000000" pitchFamily="2" charset="2"/>
-              <a:buChar char="§"/>
-            </a:pPr>
-            <a:r>
-              <a:rPr lang="en-US" sz="2800" dirty="0" smtClean="0"/>
-              <a:t> Receive push notifications to your phone</a:t>
-            </a:r>
-          </a:p>
-          <a:p>
-            <a:pPr>
-              <a:buFont typeface="Wingdings" panose="05000000000000000000" pitchFamily="2" charset="2"/>
-              <a:buChar char="§"/>
-            </a:pPr>
-            <a:r>
-              <a:rPr lang="en-US" sz="2800" dirty="0" smtClean="0"/>
-              <a:t> View calendar of events</a:t>
-            </a:r>
-          </a:p>
-          <a:p>
-            <a:pPr>
-              <a:buFont typeface="Wingdings" panose="05000000000000000000" pitchFamily="2" charset="2"/>
-              <a:buChar char="§"/>
-            </a:pPr>
             <a:r>
               <a:rPr lang="en-US" sz="2800" dirty="0"/>
-              <a:t> </a:t>
-            </a:r>
-            <a:r>
-              <a:rPr lang="en-US" sz="2800" dirty="0" smtClean="0"/>
-              <a:t>Schedule events</a:t>
-            </a:r>
-          </a:p>
-          <a:p>
-            <a:pPr marL="0" indent="0">
-              <a:buNone/>
-            </a:pPr>
-            <a:endParaRPr lang="en-US" sz="2800" dirty="0" smtClean="0"/>
+              <a:t>Manage clubs and teams</a:t>
+            </a:r>
+          </a:p>
+          <a:p>
+            <a:r>
+              <a:rPr lang="en-US" sz="2800" dirty="0"/>
+              <a:t>Receive push notifications to your phone</a:t>
+            </a:r>
+          </a:p>
+          <a:p>
+            <a:r>
+              <a:rPr lang="en-US" sz="2800" dirty="0"/>
+              <a:t>View calendar of events</a:t>
+            </a:r>
           </a:p>
           <a:p>
             <a:endParaRPr lang="en-US" dirty="0"/>
@@ -4946,7 +5225,7 @@
           <p:cNvPr id="2" name="Title 1">
             <a:extLst>
               <a:ext uri="{FF2B5EF4-FFF2-40B4-BE49-F238E27FC236}">
-                <a16:creationId xmlns:a16="http://schemas.microsoft.com/office/drawing/2014/main" id="{5CAB6557-1CDC-4939-AC62-036353EDBA57}"/>
+                <a16:creationId xmlns:a16="http://schemas.microsoft.com/office/drawing/2014/main" id="{06B93333-0B7F-4731-8A58-3C7A4877C3F7}"/>
               </a:ext>
             </a:extLst>
           </p:cNvPr>
@@ -4959,30 +5238,31 @@
         </p:nvSpPr>
         <p:spPr>
           <a:xfrm>
-            <a:off x="1097280" y="286603"/>
-            <a:ext cx="10058400" cy="807091"/>
-          </a:xfrm>
-        </p:spPr>
-        <p:txBody>
-          <a:bodyPr/>
+            <a:off x="1097280" y="286604"/>
+            <a:ext cx="10058400" cy="645726"/>
+          </a:xfrm>
+        </p:spPr>
+        <p:txBody>
+          <a:bodyPr>
+            <a:normAutofit fontScale="90000"/>
+          </a:bodyPr>
           <a:lstStyle/>
           <a:p>
             <a:r>
               <a:rPr lang="en-US" dirty="0"/>
-              <a:t>Create Profile</a:t>
-            </a:r>
+              <a:t>Class </a:t>
+            </a:r>
+            <a:r>
+              <a:rPr lang="en-US" dirty="0" smtClean="0"/>
+              <a:t>Diagram</a:t>
+            </a:r>
+            <a:endParaRPr lang="en-US" dirty="0"/>
           </a:p>
         </p:txBody>
       </p:sp>
       <p:pic>
         <p:nvPicPr>
-          <p:cNvPr id="5" name="Content Placeholder 4">
-            <a:extLst>
-              <a:ext uri="{FF2B5EF4-FFF2-40B4-BE49-F238E27FC236}">
-                <a16:creationId xmlns:a16="http://schemas.microsoft.com/office/drawing/2014/main" id="{C348EC45-D08E-4A90-A2F1-B5B435F6178E}"/>
-              </a:ext>
-            </a:extLst>
-          </p:cNvPr>
+          <p:cNvPr id="4" name="Content Placeholder 3"/>
           <p:cNvPicPr>
             <a:picLocks noGrp="1" noChangeAspect="1"/>
           </p:cNvPicPr>
@@ -5004,15 +5284,15 @@
         </p:blipFill>
         <p:spPr>
           <a:xfrm>
-            <a:off x="1389913" y="1245030"/>
-            <a:ext cx="9278088" cy="4632924"/>
+            <a:off x="4254285" y="1846262"/>
+            <a:ext cx="3642101" cy="4381757"/>
           </a:xfrm>
         </p:spPr>
       </p:pic>
     </p:spTree>
     <p:extLst>
       <p:ext uri="{BB962C8B-B14F-4D97-AF65-F5344CB8AC3E}">
-        <p14:creationId xmlns:p14="http://schemas.microsoft.com/office/powerpoint/2010/main" val="1496137810"/>
+        <p14:creationId xmlns:p14="http://schemas.microsoft.com/office/powerpoint/2010/main" val="2788991916"/>
       </p:ext>
     </p:extLst>
   </p:cSld>
@@ -5044,7 +5324,7 @@
           <p:cNvPr id="2" name="Title 1">
             <a:extLst>
               <a:ext uri="{FF2B5EF4-FFF2-40B4-BE49-F238E27FC236}">
-                <a16:creationId xmlns:a16="http://schemas.microsoft.com/office/drawing/2014/main" id="{A840D691-F4D5-42C8-85F4-FE4FBB395304}"/>
+                <a16:creationId xmlns:a16="http://schemas.microsoft.com/office/drawing/2014/main" id="{06B93333-0B7F-4731-8A58-3C7A4877C3F7}"/>
               </a:ext>
             </a:extLst>
           </p:cNvPr>
@@ -5057,30 +5337,31 @@
         </p:nvSpPr>
         <p:spPr>
           <a:xfrm>
-            <a:off x="1097280" y="286603"/>
-            <a:ext cx="10058400" cy="735373"/>
-          </a:xfrm>
-        </p:spPr>
-        <p:txBody>
-          <a:bodyPr/>
+            <a:off x="1097280" y="286604"/>
+            <a:ext cx="10058400" cy="645726"/>
+          </a:xfrm>
+        </p:spPr>
+        <p:txBody>
+          <a:bodyPr>
+            <a:normAutofit fontScale="90000"/>
+          </a:bodyPr>
           <a:lstStyle/>
           <a:p>
             <a:r>
               <a:rPr lang="en-US" dirty="0"/>
-              <a:t>Create Club</a:t>
-            </a:r>
+              <a:t>Class </a:t>
+            </a:r>
+            <a:r>
+              <a:rPr lang="en-US" dirty="0" smtClean="0"/>
+              <a:t>Diagram</a:t>
+            </a:r>
+            <a:endParaRPr lang="en-US" dirty="0"/>
           </a:p>
         </p:txBody>
       </p:sp>
       <p:pic>
         <p:nvPicPr>
-          <p:cNvPr id="5" name="Content Placeholder 4">
-            <a:extLst>
-              <a:ext uri="{FF2B5EF4-FFF2-40B4-BE49-F238E27FC236}">
-                <a16:creationId xmlns:a16="http://schemas.microsoft.com/office/drawing/2014/main" id="{5463F9B5-F910-4CF6-89FC-140FF0C5ECBA}"/>
-              </a:ext>
-            </a:extLst>
-          </p:cNvPr>
+          <p:cNvPr id="4" name="Content Placeholder 3"/>
           <p:cNvPicPr>
             <a:picLocks noGrp="1" noChangeAspect="1"/>
           </p:cNvPicPr>
@@ -5102,15 +5383,15 @@
         </p:blipFill>
         <p:spPr>
           <a:xfrm>
-            <a:off x="1219838" y="1506070"/>
-            <a:ext cx="9813284" cy="3648529"/>
+            <a:off x="2100020" y="1846263"/>
+            <a:ext cx="7834394" cy="4288300"/>
           </a:xfrm>
         </p:spPr>
       </p:pic>
     </p:spTree>
     <p:extLst>
       <p:ext uri="{BB962C8B-B14F-4D97-AF65-F5344CB8AC3E}">
-        <p14:creationId xmlns:p14="http://schemas.microsoft.com/office/powerpoint/2010/main" val="798308918"/>
+        <p14:creationId xmlns:p14="http://schemas.microsoft.com/office/powerpoint/2010/main" val="499508893"/>
       </p:ext>
     </p:extLst>
   </p:cSld>
@@ -5142,7 +5423,7 @@
           <p:cNvPr id="2" name="Title 1">
             <a:extLst>
               <a:ext uri="{FF2B5EF4-FFF2-40B4-BE49-F238E27FC236}">
-                <a16:creationId xmlns:a16="http://schemas.microsoft.com/office/drawing/2014/main" id="{1A5B2C31-61B9-43D3-8F41-50314B6A39D6}"/>
+                <a16:creationId xmlns:a16="http://schemas.microsoft.com/office/drawing/2014/main" id="{06B93333-0B7F-4731-8A58-3C7A4877C3F7}"/>
               </a:ext>
             </a:extLst>
           </p:cNvPr>
@@ -5156,7 +5437,7 @@
         <p:spPr>
           <a:xfrm>
             <a:off x="1097280" y="286604"/>
-            <a:ext cx="10058400" cy="663656"/>
+            <a:ext cx="10058400" cy="645726"/>
           </a:xfrm>
         </p:spPr>
         <p:txBody>
@@ -5167,20 +5448,14 @@
           <a:p>
             <a:r>
               <a:rPr lang="en-US" dirty="0"/>
-              <a:t>Create Event</a:t>
+              <a:t>Class Diagram</a:t>
             </a:r>
           </a:p>
         </p:txBody>
       </p:sp>
       <p:pic>
         <p:nvPicPr>
-          <p:cNvPr id="5" name="Content Placeholder 4">
-            <a:extLst>
-              <a:ext uri="{FF2B5EF4-FFF2-40B4-BE49-F238E27FC236}">
-                <a16:creationId xmlns:a16="http://schemas.microsoft.com/office/drawing/2014/main" id="{96DE7A9B-F1C2-409A-A4F8-17D72E82B42D}"/>
-              </a:ext>
-            </a:extLst>
-          </p:cNvPr>
+          <p:cNvPr id="4" name="Content Placeholder 3"/>
           <p:cNvPicPr>
             <a:picLocks noGrp="1" noChangeAspect="1"/>
           </p:cNvPicPr>
@@ -5202,15 +5477,15 @@
         </p:blipFill>
         <p:spPr>
           <a:xfrm>
-            <a:off x="164827" y="1210235"/>
-            <a:ext cx="11690972" cy="4025154"/>
+            <a:off x="2165917" y="2490597"/>
+            <a:ext cx="7608834" cy="3174034"/>
           </a:xfrm>
         </p:spPr>
       </p:pic>
     </p:spTree>
     <p:extLst>
       <p:ext uri="{BB962C8B-B14F-4D97-AF65-F5344CB8AC3E}">
-        <p14:creationId xmlns:p14="http://schemas.microsoft.com/office/powerpoint/2010/main" val="963349387"/>
+        <p14:creationId xmlns:p14="http://schemas.microsoft.com/office/powerpoint/2010/main" val="2706253443"/>
       </p:ext>
     </p:extLst>
   </p:cSld>
@@ -5242,7 +5517,7 @@
           <p:cNvPr id="2" name="Title 1">
             <a:extLst>
               <a:ext uri="{FF2B5EF4-FFF2-40B4-BE49-F238E27FC236}">
-                <a16:creationId xmlns:a16="http://schemas.microsoft.com/office/drawing/2014/main" id="{511E7CCA-A5FD-40A0-B51C-117B3F9B28F8}"/>
+                <a16:creationId xmlns:a16="http://schemas.microsoft.com/office/drawing/2014/main" id="{5CAB6557-1CDC-4939-AC62-036353EDBA57}"/>
               </a:ext>
             </a:extLst>
           </p:cNvPr>
@@ -5255,19 +5530,17 @@
         </p:nvSpPr>
         <p:spPr>
           <a:xfrm>
-            <a:off x="1097280" y="286604"/>
-            <a:ext cx="10058400" cy="663656"/>
-          </a:xfrm>
-        </p:spPr>
-        <p:txBody>
-          <a:bodyPr>
-            <a:normAutofit fontScale="90000"/>
-          </a:bodyPr>
+            <a:off x="1097280" y="286603"/>
+            <a:ext cx="10058400" cy="807091"/>
+          </a:xfrm>
+        </p:spPr>
+        <p:txBody>
+          <a:bodyPr/>
           <a:lstStyle/>
           <a:p>
             <a:r>
               <a:rPr lang="en-US" dirty="0"/>
-              <a:t>Join Club</a:t>
+              <a:t>Create Profile</a:t>
             </a:r>
           </a:p>
         </p:txBody>
@@ -5277,7 +5550,7 @@
           <p:cNvPr id="5" name="Content Placeholder 4">
             <a:extLst>
               <a:ext uri="{FF2B5EF4-FFF2-40B4-BE49-F238E27FC236}">
-                <a16:creationId xmlns:a16="http://schemas.microsoft.com/office/drawing/2014/main" id="{F3E17A34-B346-4CE0-B0C5-991228262EDB}"/>
+                <a16:creationId xmlns:a16="http://schemas.microsoft.com/office/drawing/2014/main" id="{C348EC45-D08E-4A90-A2F1-B5B435F6178E}"/>
               </a:ext>
             </a:extLst>
           </p:cNvPr>
@@ -5302,15 +5575,15 @@
         </p:blipFill>
         <p:spPr>
           <a:xfrm>
-            <a:off x="603434" y="950260"/>
-            <a:ext cx="11032754" cy="5142708"/>
+            <a:off x="1389913" y="1245030"/>
+            <a:ext cx="9278088" cy="4632924"/>
           </a:xfrm>
         </p:spPr>
       </p:pic>
     </p:spTree>
     <p:extLst>
       <p:ext uri="{BB962C8B-B14F-4D97-AF65-F5344CB8AC3E}">
-        <p14:creationId xmlns:p14="http://schemas.microsoft.com/office/powerpoint/2010/main" val="3180704940"/>
+        <p14:creationId xmlns:p14="http://schemas.microsoft.com/office/powerpoint/2010/main" val="1496137810"/>
       </p:ext>
     </p:extLst>
   </p:cSld>
@@ -5342,7 +5615,7 @@
           <p:cNvPr id="2" name="Title 1">
             <a:extLst>
               <a:ext uri="{FF2B5EF4-FFF2-40B4-BE49-F238E27FC236}">
-                <a16:creationId xmlns:a16="http://schemas.microsoft.com/office/drawing/2014/main" id="{02540FA4-77CF-4A56-9097-B9FE2C134D13}"/>
+                <a16:creationId xmlns:a16="http://schemas.microsoft.com/office/drawing/2014/main" id="{A840D691-F4D5-42C8-85F4-FE4FBB395304}"/>
               </a:ext>
             </a:extLst>
           </p:cNvPr>
@@ -5355,19 +5628,17 @@
         </p:nvSpPr>
         <p:spPr>
           <a:xfrm>
-            <a:off x="1097280" y="286604"/>
-            <a:ext cx="10058400" cy="663656"/>
-          </a:xfrm>
-        </p:spPr>
-        <p:txBody>
-          <a:bodyPr>
-            <a:normAutofit fontScale="90000"/>
-          </a:bodyPr>
+            <a:off x="1097280" y="286603"/>
+            <a:ext cx="10058400" cy="735373"/>
+          </a:xfrm>
+        </p:spPr>
+        <p:txBody>
+          <a:bodyPr/>
           <a:lstStyle/>
           <a:p>
             <a:r>
               <a:rPr lang="en-US" dirty="0"/>
-              <a:t>Leave Club</a:t>
+              <a:t>Create Club</a:t>
             </a:r>
           </a:p>
         </p:txBody>
@@ -5377,7 +5648,7 @@
           <p:cNvPr id="5" name="Content Placeholder 4">
             <a:extLst>
               <a:ext uri="{FF2B5EF4-FFF2-40B4-BE49-F238E27FC236}">
-                <a16:creationId xmlns:a16="http://schemas.microsoft.com/office/drawing/2014/main" id="{8808A8B9-9E47-4B82-9910-BA770C88A9B6}"/>
+                <a16:creationId xmlns:a16="http://schemas.microsoft.com/office/drawing/2014/main" id="{5463F9B5-F910-4CF6-89FC-140FF0C5ECBA}"/>
               </a:ext>
             </a:extLst>
           </p:cNvPr>
@@ -5402,15 +5673,15 @@
         </p:blipFill>
         <p:spPr>
           <a:xfrm>
-            <a:off x="1484286" y="959226"/>
-            <a:ext cx="9005821" cy="4918728"/>
+            <a:off x="1219838" y="1506070"/>
+            <a:ext cx="9813284" cy="3648529"/>
           </a:xfrm>
         </p:spPr>
       </p:pic>
     </p:spTree>
     <p:extLst>
       <p:ext uri="{BB962C8B-B14F-4D97-AF65-F5344CB8AC3E}">
-        <p14:creationId xmlns:p14="http://schemas.microsoft.com/office/powerpoint/2010/main" val="835220665"/>
+        <p14:creationId xmlns:p14="http://schemas.microsoft.com/office/powerpoint/2010/main" val="798308918"/>
       </p:ext>
     </p:extLst>
   </p:cSld>

</xml_diff>

<commit_message>
Updated scope of system again
</commit_message>
<xml_diff>
--- a/Crimson Clubs (Design).pptx
+++ b/Crimson Clubs (Design).pptx
@@ -4812,11 +4812,7 @@
             </a:pPr>
             <a:r>
               <a:rPr lang="en-US" sz="2400" dirty="0" smtClean="0"/>
-              <a:t> Good </a:t>
-            </a:r>
-            <a:r>
-              <a:rPr lang="en-US" sz="2400" dirty="0" smtClean="0"/>
-              <a:t>progress</a:t>
+              <a:t> Good progress</a:t>
             </a:r>
           </a:p>
           <a:p>
@@ -4832,7 +4828,6 @@
               <a:rPr lang="en-US" sz="2400" dirty="0" smtClean="0"/>
               <a:t>Shift from design to implementation</a:t>
             </a:r>
-            <a:endParaRPr lang="en-US" sz="2400" dirty="0" smtClean="0"/>
           </a:p>
           <a:p>
             <a:pPr>
@@ -4857,7 +4852,6 @@
               <a:rPr lang="en-US" sz="2400" dirty="0" smtClean="0"/>
               <a:t> Focus on demo</a:t>
             </a:r>
-            <a:endParaRPr lang="en-US" sz="2400" dirty="0" smtClean="0"/>
           </a:p>
         </p:txBody>
       </p:sp>
@@ -4996,13 +4990,8 @@
             </a:pPr>
             <a:r>
               <a:rPr lang="en-US" sz="2000" dirty="0" smtClean="0"/>
-              <a:t>Intrusive </a:t>
-            </a:r>
-            <a:r>
-              <a:rPr lang="en-US" sz="2000" dirty="0" smtClean="0"/>
-              <a:t>Advertisements</a:t>
-            </a:r>
-            <a:endParaRPr lang="en-US" sz="2000" dirty="0" smtClean="0"/>
+              <a:t>Intrusive Advertisements</a:t>
+            </a:r>
           </a:p>
         </p:txBody>
       </p:sp>
@@ -5131,6 +5120,20 @@
             <a:r>
               <a:rPr lang="en-US" sz="2400" dirty="0" smtClean="0"/>
               <a:t>events</a:t>
+            </a:r>
+          </a:p>
+          <a:p>
+            <a:pPr>
+              <a:buFont typeface="Wingdings" panose="05000000000000000000" pitchFamily="2" charset="2"/>
+              <a:buChar char="§"/>
+            </a:pPr>
+            <a:r>
+              <a:rPr lang="en-US" sz="2400" dirty="0"/>
+              <a:t> </a:t>
+            </a:r>
+            <a:r>
+              <a:rPr lang="en-US" sz="2400" smtClean="0"/>
+              <a:t>Schedule events</a:t>
             </a:r>
             <a:endParaRPr lang="en-US" sz="2400" dirty="0"/>
           </a:p>

</xml_diff>